<commit_message>
Add Animation Event Tutorial
- Apply how to use animation
  events

- Delete Animator Controller
  Tutorial

- Physical PPT data update

- Adding and deleting resource
  data
</commit_message>
<xml_diff>
--- a/Assets/Physics/PPT Data/Physics Example.pptx
+++ b/Assets/Physics/PPT Data/Physics Example.pptx
@@ -2,7 +2,7 @@
 <file path=ppt/presentation.xml><?xml version="1.0" encoding="utf-8"?>
 <p:presentation xmlns:a="http://schemas.openxmlformats.org/drawingml/2006/main" xmlns:r="http://schemas.openxmlformats.org/officeDocument/2006/relationships" xmlns:p="http://schemas.openxmlformats.org/presentationml/2006/main" xmlns:p14="http://schemas.microsoft.com/office/powerpoint/2010/main" saveSubsetFonts="1" firstSlideNum="0">
   <p:sldMasterIdLst>
-    <p:sldMasterId id="2147485481" r:id="rId12"/>
+    <p:sldMasterId id="2147485488" r:id="rId12"/>
   </p:sldMasterIdLst>
   <p:notesMasterIdLst>
     <p:notesMasterId r:id="rId14"/>
@@ -12,7 +12,7 @@
     <p:sldId id="277" r:id="rId17"/>
     <p:sldId id="289" r:id="rId18"/>
     <p:sldId id="290" r:id="rId19"/>
-    <p:sldId id="280" r:id="rId20"/>
+    <p:sldId id="291" r:id="rId20"/>
     <p:sldId id="287" r:id="rId21"/>
   </p:sldIdLst>
   <p:sldSz cx="12192000" cy="6858000"/>
@@ -8500,7 +8500,7 @@
 </file>
 
 <file path=ppt/slides/slide5.xml><?xml version="1.0" encoding="utf-8"?>
-<p:sld xmlns:a="http://schemas.openxmlformats.org/drawingml/2006/main" xmlns:r="http://schemas.openxmlformats.org/officeDocument/2006/relationships" xmlns:p="http://schemas.openxmlformats.org/presentationml/2006/main" xmlns:p14="http://schemas.microsoft.com/office/powerpoint/2010/main">
+<p:sld xmlns:a="http://schemas.openxmlformats.org/drawingml/2006/main" xmlns:r="http://schemas.openxmlformats.org/officeDocument/2006/relationships" xmlns:p="http://schemas.openxmlformats.org/presentationml/2006/main">
   <p:cSld>
     <p:spTree>
       <p:nvGrpSpPr>
@@ -8526,8 +8526,8 @@
         </p:nvSpPr>
         <p:spPr>
           <a:xfrm rot="0">
-            <a:off x="4333875" y="419735"/>
-            <a:ext cx="3536950" cy="554990"/>
+            <a:off x="4236085" y="419735"/>
+            <a:ext cx="3716020" cy="478155"/>
           </a:xfrm>
           <a:prstGeom prst="rect"/>
           <a:noFill/>
@@ -8542,43 +8542,43 @@
           </a:bodyPr>
           <a:lstStyle/>
           <a:p>
-            <a:pPr marL="0" indent="0" rtl="0" algn="l" defTabSz="914400" eaLnBrk="1" latinLnBrk="0" hangingPunct="1">
-              <a:buFontTx/>
-              <a:buNone/>
-            </a:pPr>
-            <a:r>
-              <a:rPr lang="ko-KR" sz="3000" b="1">
+            <a:pPr marL="0" indent="0" rtl="0" algn="ctr" defTabSz="914400" eaLnBrk="1" latinLnBrk="0" hangingPunct="1">
+              <a:buFontTx/>
+              <a:buNone/>
+            </a:pPr>
+            <a:r>
+              <a:rPr lang="ko-KR" sz="2500" b="1">
                 <a:solidFill>
                   <a:schemeClr val="tx1"/>
                 </a:solidFill>
-                <a:latin typeface="맑은 고딕" charset="0"/>
-                <a:ea typeface="맑은 고딕" charset="0"/>
-              </a:rPr>
-              <a:t>일곱 번째 </a:t>
-            </a:r>
-            <a:r>
-              <a:rPr lang="ko-KR" sz="3000" b="1">
+                <a:latin typeface="나눔바른고딕" charset="0"/>
+                <a:ea typeface="나눔바른고딕" charset="0"/>
+              </a:rPr>
+              <a:t>다섯</a:t>
+            </a:r>
+            <a:r>
+              <a:rPr lang="ko-KR" sz="2500" b="1">
                 <a:solidFill>
                   <a:schemeClr val="tx1"/>
                 </a:solidFill>
-                <a:latin typeface="맑은 고딕" charset="0"/>
-                <a:ea typeface="맑은 고딕" charset="0"/>
-              </a:rPr>
-              <a:t>튜토리얼</a:t>
-            </a:r>
-            <a:endParaRPr lang="ko-KR" altLang="en-US" sz="3000" b="1">
+                <a:latin typeface="나눔바른고딕" charset="0"/>
+                <a:ea typeface="나눔바른고딕" charset="0"/>
+              </a:rPr>
+              <a:t> 번째 튜토리얼</a:t>
+            </a:r>
+            <a:endParaRPr lang="ko-KR" altLang="en-US" sz="2500" b="1">
               <a:solidFill>
                 <a:schemeClr val="tx1"/>
               </a:solidFill>
-              <a:latin typeface="맑은 고딕" charset="0"/>
-              <a:ea typeface="맑은 고딕" charset="0"/>
+              <a:latin typeface="나눔바른고딕" charset="0"/>
+              <a:ea typeface="나눔바른고딕" charset="0"/>
             </a:endParaRPr>
           </a:p>
         </p:txBody>
       </p:sp>
       <p:sp>
         <p:nvSpPr>
-          <p:cNvPr id="10" name="Rect 0"/>
+          <p:cNvPr id="29" name="Rect 0"/>
           <p:cNvSpPr txBox="1">
             <a:spLocks/>
           </p:cNvSpPr>
@@ -8586,8 +8586,8 @@
         </p:nvSpPr>
         <p:spPr>
           <a:xfrm rot="0">
-            <a:off x="1222375" y="3844290"/>
-            <a:ext cx="4140200" cy="2308225"/>
+            <a:off x="6821805" y="2658745"/>
+            <a:ext cx="4144010" cy="1231265"/>
           </a:xfrm>
           <a:prstGeom prst="rect"/>
           <a:noFill/>
@@ -8607,55 +8607,598 @@
               <a:buNone/>
             </a:pPr>
             <a:r>
-              <a:rPr lang="ko-KR" sz="1800">
-                <a:latin typeface="맑은 고딕" charset="0"/>
-                <a:ea typeface="맑은 고딕" charset="0"/>
-              </a:rPr>
-              <a:t>Addforce( ) 함수란?</a:t>
+              <a:rPr lang="ko-KR" sz="2000" b="1">
+                <a:solidFill>
+                  <a:srgbClr val="0611F2"/>
+                </a:solidFill>
+                <a:latin typeface="맑은 고딕" charset="0"/>
+                <a:ea typeface="맑은 고딕" charset="0"/>
+              </a:rPr>
+              <a:t>1</a:t>
+            </a:r>
+            <a:r>
+              <a:rPr lang="ko-KR" sz="2000" b="1">
+                <a:solidFill>
+                  <a:srgbClr val="0611F2"/>
+                </a:solidFill>
+                <a:latin typeface="맑은 고딕" charset="0"/>
+                <a:ea typeface="맑은 고딕" charset="0"/>
+              </a:rPr>
+              <a:t>6</a:t>
+            </a:r>
+            <a:r>
+              <a:rPr sz="2000" b="1">
+                <a:solidFill>
+                  <a:srgbClr val="0611F2"/>
+                </a:solidFill>
+                <a:latin typeface="맑은 고딕" charset="0"/>
+                <a:ea typeface="맑은 고딕" charset="0"/>
+              </a:rPr>
+              <a:t>.</a:t>
+            </a:r>
+            <a:r>
+              <a:rPr lang="ko-KR" sz="2000" b="1">
+                <a:solidFill>
+                  <a:srgbClr val="0611F2"/>
+                </a:solidFill>
+                <a:latin typeface="맑은 고딕" charset="0"/>
+                <a:ea typeface="맑은 고딕" charset="0"/>
+              </a:rPr>
+              <a:t> </a:t>
+            </a:r>
+            <a:r>
+              <a:rPr lang="ko-KR" sz="1800">
+                <a:latin typeface="맑은 고딕" charset="0"/>
+                <a:ea typeface="맑은 고딕" charset="0"/>
+              </a:rPr>
+              <a:t>그런 다음 Project 폴더 아래에 </a:t>
+            </a:r>
+            <a:r>
+              <a:rPr lang="ko-KR" sz="1800">
+                <a:latin typeface="맑은 고딕" charset="0"/>
+                <a:ea typeface="맑은 고딕" charset="0"/>
+              </a:rPr>
+              <a:t>있는</a:t>
+            </a:r>
+            <a:r>
+              <a:rPr lang="ko-KR" sz="1800">
+                <a:latin typeface="맑은 고딕" charset="0"/>
+                <a:ea typeface="맑은 고딕" charset="0"/>
+              </a:rPr>
+              <a:t> </a:t>
+            </a:r>
+            <a:r>
+              <a:rPr lang="ko-KR" sz="1800">
+                <a:latin typeface="맑은 고딕" charset="0"/>
+                <a:ea typeface="맑은 고딕" charset="0"/>
+              </a:rPr>
+              <a:t>Texture</a:t>
+            </a:r>
+            <a:r>
+              <a:rPr lang="ko-KR" sz="1800">
+                <a:latin typeface="맑은 고딕" charset="0"/>
+                <a:ea typeface="맑은 고딕" charset="0"/>
+              </a:rPr>
+              <a:t> </a:t>
+            </a:r>
+            <a:r>
+              <a:rPr lang="ko-KR" sz="1800">
+                <a:latin typeface="맑은 고딕" charset="0"/>
+                <a:ea typeface="맑은 고딕" charset="0"/>
+              </a:rPr>
+              <a:t>폴더에</a:t>
+            </a:r>
+            <a:r>
+              <a:rPr lang="ko-KR" sz="1800">
+                <a:latin typeface="맑은 고딕" charset="0"/>
+                <a:ea typeface="맑은 고딕" charset="0"/>
+              </a:rPr>
+              <a:t> Billiard Ball Two </a:t>
+            </a:r>
+            <a:r>
+              <a:rPr lang="ko-KR" sz="1800">
+                <a:latin typeface="맑은 고딕" charset="0"/>
+                <a:ea typeface="맑은 고딕" charset="0"/>
+              </a:rPr>
+              <a:t>텍스처를</a:t>
+            </a:r>
+            <a:r>
+              <a:rPr lang="ko-KR" sz="1800">
+                <a:latin typeface="맑은 고딕" charset="0"/>
+                <a:ea typeface="맑은 고딕" charset="0"/>
+              </a:rPr>
+              <a:t> </a:t>
+            </a:r>
+            <a:r>
+              <a:rPr lang="ko-KR" sz="1800">
+                <a:latin typeface="맑은 고딕" charset="0"/>
+                <a:ea typeface="맑은 고딕" charset="0"/>
+              </a:rPr>
+              <a:t>Billiard</a:t>
+            </a:r>
+            <a:r>
+              <a:rPr lang="ko-KR" sz="1800">
+                <a:latin typeface="맑은 고딕" charset="0"/>
+                <a:ea typeface="맑은 고딕" charset="0"/>
+              </a:rPr>
+              <a:t> Ball (Two) </a:t>
+            </a:r>
+            <a:r>
+              <a:rPr lang="ko-KR" sz="1800">
+                <a:latin typeface="맑은 고딕" charset="0"/>
+                <a:ea typeface="맑은 고딕" charset="0"/>
+              </a:rPr>
+              <a:t>오브젝트에</a:t>
+            </a:r>
+            <a:r>
+              <a:rPr lang="ko-KR" sz="1800">
+                <a:latin typeface="맑은 고딕" charset="0"/>
+                <a:ea typeface="맑은 고딕" charset="0"/>
+              </a:rPr>
+              <a:t> </a:t>
+            </a:r>
+            <a:r>
+              <a:rPr lang="ko-KR" sz="1800">
+                <a:latin typeface="맑은 고딕" charset="0"/>
+                <a:ea typeface="맑은 고딕" charset="0"/>
+              </a:rPr>
+              <a:t>넣어줍니다.</a:t>
             </a:r>
             <a:endParaRPr lang="ko-KR" altLang="en-US" sz="1800">
               <a:latin typeface="맑은 고딕" charset="0"/>
               <a:ea typeface="맑은 고딕" charset="0"/>
             </a:endParaRPr>
           </a:p>
+        </p:txBody>
+      </p:sp>
+      <p:sp>
+        <p:nvSpPr>
+          <p:cNvPr id="48" name="Rect 0"/>
+          <p:cNvSpPr txBox="1">
+            <a:spLocks/>
+          </p:cNvSpPr>
+          <p:nvPr/>
+        </p:nvSpPr>
+        <p:spPr>
+          <a:xfrm rot="0">
+            <a:off x="1234440" y="5178425"/>
+            <a:ext cx="4130675" cy="954405"/>
+          </a:xfrm>
+          <a:prstGeom prst="rect"/>
+          <a:noFill/>
+          <a:ln w="0">
+            <a:noFill/>
+            <a:prstDash/>
+          </a:ln>
+        </p:spPr>
+        <p:txBody>
+          <a:bodyPr wrap="square" lIns="89535" tIns="46355" rIns="89535" bIns="46355" numCol="1" vert="horz" anchor="t">
+            <a:spAutoFit/>
+          </a:bodyPr>
+          <a:lstStyle/>
           <a:p>
             <a:pPr marL="0" indent="0" rtl="0" algn="l" defTabSz="914400" eaLnBrk="1" latinLnBrk="0" hangingPunct="1">
               <a:buFontTx/>
               <a:buNone/>
             </a:pPr>
             <a:r>
-              <a:rPr lang="ko-KR" sz="1800">
-                <a:latin typeface="맑은 고딕" charset="0"/>
-                <a:ea typeface="맑은 고딕" charset="0"/>
-              </a:rPr>
-              <a:t>게임 오브젝트에 일정한 힘을 가해 가속도로 이동시키는 함수입니다.</a:t>
+              <a:rPr lang="ko-KR" sz="2000" b="1">
+                <a:solidFill>
+                  <a:srgbClr val="0611F2"/>
+                </a:solidFill>
+                <a:latin typeface="맑은 고딕" charset="0"/>
+                <a:ea typeface="맑은 고딕" charset="0"/>
+              </a:rPr>
+              <a:t>15</a:t>
+            </a:r>
+            <a:r>
+              <a:rPr sz="2000" b="1">
+                <a:solidFill>
+                  <a:srgbClr val="0611F2"/>
+                </a:solidFill>
+                <a:latin typeface="맑은 고딕" charset="0"/>
+                <a:ea typeface="맑은 고딕" charset="0"/>
+              </a:rPr>
+              <a:t>.</a:t>
+            </a:r>
+            <a:r>
+              <a:rPr lang="ko-KR" sz="2000" b="1">
+                <a:solidFill>
+                  <a:srgbClr val="0611F2"/>
+                </a:solidFill>
+                <a:latin typeface="맑은 고딕" charset="0"/>
+                <a:ea typeface="맑은 고딕" charset="0"/>
+              </a:rPr>
+              <a:t> </a:t>
+            </a:r>
+            <a:r>
+              <a:rPr lang="ko-KR" sz="1800">
+                <a:latin typeface="맑은 고딕" charset="0"/>
+                <a:ea typeface="맑은 고딕" charset="0"/>
+              </a:rPr>
+              <a:t>그리고 Project 폴더 아래에 있는 </a:t>
+            </a:r>
+            <a:r>
+              <a:rPr lang="ko-KR" sz="1800">
+                <a:latin typeface="맑은 고딕" charset="0"/>
+                <a:ea typeface="맑은 고딕" charset="0"/>
+              </a:rPr>
+              <a:t>Mo</a:t>
+            </a:r>
+            <a:r>
+              <a:rPr lang="ko-KR" sz="1800">
+                <a:latin typeface="맑은 고딕" charset="0"/>
+                <a:ea typeface="맑은 고딕" charset="0"/>
+              </a:rPr>
+              <a:t>del</a:t>
+            </a:r>
+            <a:r>
+              <a:rPr lang="ko-KR" sz="1800">
+                <a:latin typeface="맑은 고딕" charset="0"/>
+                <a:ea typeface="맑은 고딕" charset="0"/>
+              </a:rPr>
+              <a:t> 폴더에 Board 오브젝트를</a:t>
+            </a:r>
+            <a:r>
+              <a:rPr lang="ko-KR" sz="1800">
+                <a:latin typeface="맑은 고딕" charset="0"/>
+                <a:ea typeface="맑은 고딕" charset="0"/>
+              </a:rPr>
+              <a:t> </a:t>
+            </a:r>
+            <a:r>
+              <a:rPr lang="ko-KR" sz="1800">
+                <a:latin typeface="맑은 고딕" charset="0"/>
+                <a:ea typeface="맑은 고딕" charset="0"/>
+              </a:rPr>
+              <a:t>월드 </a:t>
+            </a:r>
+            <a:r>
+              <a:rPr lang="ko-KR" sz="1800">
+                <a:latin typeface="맑은 고딕" charset="0"/>
+                <a:ea typeface="맑은 고딕" charset="0"/>
+              </a:rPr>
+              <a:t>공간에</a:t>
+            </a:r>
+            <a:r>
+              <a:rPr lang="ko-KR" sz="1800">
+                <a:latin typeface="맑은 고딕" charset="0"/>
+                <a:ea typeface="맑은 고딕" charset="0"/>
+              </a:rPr>
+              <a:t> </a:t>
+            </a:r>
+            <a:r>
+              <a:rPr lang="ko-KR" sz="1800">
+                <a:latin typeface="맑은 고딕" charset="0"/>
+                <a:ea typeface="맑은 고딕" charset="0"/>
+              </a:rPr>
+              <a:t>배치합니다.</a:t>
             </a:r>
             <a:endParaRPr lang="ko-KR" altLang="en-US" sz="1800">
               <a:latin typeface="맑은 고딕" charset="0"/>
               <a:ea typeface="맑은 고딕" charset="0"/>
             </a:endParaRPr>
           </a:p>
+        </p:txBody>
+      </p:sp>
+      <p:sp>
+        <p:nvSpPr>
+          <p:cNvPr id="54" name="Rect 0"/>
+          <p:cNvSpPr txBox="1">
+            <a:spLocks/>
+          </p:cNvSpPr>
+          <p:nvPr/>
+        </p:nvSpPr>
+        <p:spPr>
+          <a:xfrm rot="0">
+            <a:off x="6809740" y="5465445"/>
+            <a:ext cx="4156710" cy="677545"/>
+          </a:xfrm>
+          <a:prstGeom prst="rect"/>
+          <a:noFill/>
+          <a:ln w="0">
+            <a:noFill/>
+            <a:prstDash/>
+          </a:ln>
+        </p:spPr>
+        <p:txBody>
+          <a:bodyPr wrap="square" lIns="89535" tIns="46355" rIns="89535" bIns="46355" numCol="1" vert="horz" anchor="t">
+            <a:spAutoFit/>
+          </a:bodyPr>
+          <a:lstStyle/>
           <a:p>
             <a:pPr marL="0" indent="0" rtl="0" algn="l" defTabSz="914400" eaLnBrk="1" latinLnBrk="0" hangingPunct="1">
               <a:buFontTx/>
               <a:buNone/>
             </a:pPr>
+            <a:r>
+              <a:rPr lang="ko-KR" sz="2000" b="1">
+                <a:solidFill>
+                  <a:srgbClr val="0611F2"/>
+                </a:solidFill>
+                <a:latin typeface="맑은 고딕" charset="0"/>
+                <a:ea typeface="맑은 고딕" charset="0"/>
+              </a:rPr>
+              <a:t>1</a:t>
+            </a:r>
+            <a:r>
+              <a:rPr lang="ko-KR" sz="2000" b="1">
+                <a:solidFill>
+                  <a:srgbClr val="0611F2"/>
+                </a:solidFill>
+                <a:latin typeface="맑은 고딕" charset="0"/>
+                <a:ea typeface="맑은 고딕" charset="0"/>
+              </a:rPr>
+              <a:t>7</a:t>
+            </a:r>
+            <a:r>
+              <a:rPr sz="2000" b="1">
+                <a:solidFill>
+                  <a:srgbClr val="0611F2"/>
+                </a:solidFill>
+                <a:latin typeface="맑은 고딕" charset="0"/>
+                <a:ea typeface="맑은 고딕" charset="0"/>
+              </a:rPr>
+              <a:t>.</a:t>
+            </a:r>
+            <a:r>
+              <a:rPr lang="ko-KR" sz="2000" b="1">
+                <a:solidFill>
+                  <a:srgbClr val="0611F2"/>
+                </a:solidFill>
+                <a:latin typeface="맑은 고딕" charset="0"/>
+                <a:ea typeface="맑은 고딕" charset="0"/>
+              </a:rPr>
+              <a:t> </a:t>
+            </a:r>
+            <a:r>
+              <a:rPr lang="ko-KR" sz="1800">
+                <a:latin typeface="맑은 고딕" charset="0"/>
+                <a:ea typeface="맑은 고딕" charset="0"/>
+              </a:rPr>
+              <a:t>그다음 Board 오브젝트에 Mesh </a:t>
+            </a:r>
+            <a:r>
+              <a:rPr lang="ko-KR" sz="1800">
+                <a:latin typeface="맑은 고딕" charset="0"/>
+                <a:ea typeface="맑은 고딕" charset="0"/>
+              </a:rPr>
+              <a:t>Collider</a:t>
+            </a:r>
+            <a:r>
+              <a:rPr lang="ko-KR" sz="1800">
+                <a:latin typeface="맑은 고딕" charset="0"/>
+                <a:ea typeface="맑은 고딕" charset="0"/>
+              </a:rPr>
+              <a:t> 컴포넌트를 추가합니다.</a:t>
+            </a:r>
             <a:endParaRPr lang="ko-KR" altLang="en-US" sz="1800">
               <a:latin typeface="맑은 고딕" charset="0"/>
               <a:ea typeface="맑은 고딕" charset="0"/>
             </a:endParaRPr>
           </a:p>
+        </p:txBody>
+      </p:sp>
+      <p:pic>
+        <p:nvPicPr>
+          <p:cNvPr id="55" name="그림 1" descr="C:/Users/Admin1/AppData/Roaming/PolarisOffice/ETemp/29716_8262256/fImage725117241.png"/>
+          <p:cNvPicPr>
+            <a:picLocks noChangeAspect="1"/>
+          </p:cNvPicPr>
+          <p:nvPr/>
+        </p:nvPicPr>
+        <p:blipFill rotWithShape="1">
+          <a:blip r:embed="rId2" cstate="print">
+            <a:extLst>
+              <a:ext uri="{28A0092B-C50C-407E-A947-70E740481C1C}">
+                <a14:useLocalDpi xmlns:a14="http://schemas.microsoft.com/office/drawing/2010/main" val="0"/>
+              </a:ext>
+            </a:extLst>
+          </a:blip>
+          <a:stretch>
+            <a:fillRect/>
+          </a:stretch>
+        </p:blipFill>
+        <p:spPr>
+          <a:xfrm rot="0">
+            <a:off x="1240790" y="1452245"/>
+            <a:ext cx="2007235" cy="1303020"/>
+          </a:xfrm>
+          <a:prstGeom prst="roundRect"/>
+          <a:solidFill>
+            <a:srgbClr val="EDEDED"/>
+          </a:solidFill>
+        </p:spPr>
+      </p:pic>
+      <p:pic>
+        <p:nvPicPr>
+          <p:cNvPr id="56" name="그림 4" descr="C:/Users/Admin1/AppData/Roaming/PolarisOffice/ETemp/29716_8262256/fImage75571738467.png"/>
+          <p:cNvPicPr>
+            <a:picLocks noChangeAspect="1"/>
+          </p:cNvPicPr>
+          <p:nvPr/>
+        </p:nvPicPr>
+        <p:blipFill rotWithShape="1">
+          <a:blip r:embed="rId3" cstate="print">
+            <a:extLst>
+              <a:ext uri="{28A0092B-C50C-407E-A947-70E740481C1C}">
+                <a14:useLocalDpi xmlns:a14="http://schemas.microsoft.com/office/drawing/2010/main" val="0"/>
+              </a:ext>
+            </a:extLst>
+          </a:blip>
+          <a:stretch>
+            <a:fillRect/>
+          </a:stretch>
+        </p:blipFill>
+        <p:spPr>
+          <a:xfrm rot="0">
+            <a:off x="3359785" y="1447165"/>
+            <a:ext cx="2007235" cy="1310005"/>
+          </a:xfrm>
+          <a:prstGeom prst="roundRect"/>
+          <a:solidFill>
+            <a:srgbClr val="EDEDED"/>
+          </a:solidFill>
+        </p:spPr>
+      </p:pic>
+      <p:pic>
+        <p:nvPicPr>
+          <p:cNvPr id="57" name="그림 11" descr="C:/Users/Admin1/AppData/Roaming/PolarisOffice/ETemp/29716_8262256/fImage2242171946962.png"/>
+          <p:cNvPicPr>
+            <a:picLocks noChangeAspect="1"/>
+          </p:cNvPicPr>
+          <p:nvPr/>
+        </p:nvPicPr>
+        <p:blipFill rotWithShape="1">
+          <a:blip r:embed="rId4" cstate="hqprint">
+            <a:extLst>
+              <a:ext uri="{28A0092B-C50C-407E-A947-70E740481C1C}">
+                <a14:useLocalDpi xmlns:a14="http://schemas.microsoft.com/office/drawing/2010/main"/>
+              </a:ext>
+            </a:extLst>
+          </a:blip>
+          <a:stretch>
+            <a:fillRect/>
+          </a:stretch>
+        </p:blipFill>
+        <p:spPr>
+          <a:xfrm rot="0">
+            <a:off x="2945130" y="1912620"/>
+            <a:ext cx="708025" cy="396875"/>
+          </a:xfrm>
+          <a:prstGeom prst="rect"/>
+          <a:noFill/>
+        </p:spPr>
+      </p:pic>
+      <p:sp>
+        <p:nvSpPr>
+          <p:cNvPr id="58" name="텍스트 상자 12"/>
+          <p:cNvSpPr txBox="1">
+            <a:spLocks/>
+          </p:cNvSpPr>
+          <p:nvPr/>
+        </p:nvSpPr>
+        <p:spPr>
+          <a:xfrm rot="0">
+            <a:off x="1237615" y="2820670"/>
+            <a:ext cx="4129405" cy="954405"/>
+          </a:xfrm>
+          <a:prstGeom prst="rect"/>
+          <a:noFill/>
+          <a:ln w="0">
+            <a:noFill/>
+            <a:prstDash/>
+          </a:ln>
+        </p:spPr>
+        <p:txBody>
+          <a:bodyPr wrap="square" lIns="89535" tIns="46355" rIns="89535" bIns="46355" numCol="1" vert="horz" anchor="t">
+            <a:spAutoFit/>
+          </a:bodyPr>
+          <a:lstStyle/>
           <a:p>
             <a:pPr marL="0" indent="0" rtl="0" algn="l" defTabSz="914400" eaLnBrk="1" latinLnBrk="0" hangingPunct="1">
               <a:buFontTx/>
               <a:buNone/>
             </a:pPr>
             <a:r>
-              <a:rPr lang="ko-KR" sz="1800">
-                <a:latin typeface="맑은 고딕" charset="0"/>
-                <a:ea typeface="맑은 고딕" charset="0"/>
-              </a:rPr>
-              <a:t>그리고 F = ma 공식이 적용되어 같은 힘을 주었을 때 게임 오브젝트의 질량에 따라 가속도가 다르게 적용됩니다.</a:t>
+              <a:rPr lang="ko-KR" sz="2000" b="1">
+                <a:solidFill>
+                  <a:srgbClr val="0611F2"/>
+                </a:solidFill>
+                <a:latin typeface="맑은 고딕" charset="0"/>
+                <a:ea typeface="맑은 고딕" charset="0"/>
+              </a:rPr>
+              <a:t>14</a:t>
+            </a:r>
+            <a:r>
+              <a:rPr sz="2000" b="1">
+                <a:solidFill>
+                  <a:srgbClr val="0611F2"/>
+                </a:solidFill>
+                <a:latin typeface="맑은 고딕" charset="0"/>
+                <a:ea typeface="맑은 고딕" charset="0"/>
+              </a:rPr>
+              <a:t>.</a:t>
+            </a:r>
+            <a:r>
+              <a:rPr lang="ko-KR" sz="2000" b="1">
+                <a:solidFill>
+                  <a:srgbClr val="0611F2"/>
+                </a:solidFill>
+                <a:latin typeface="맑은 고딕" charset="0"/>
+                <a:ea typeface="맑은 고딕" charset="0"/>
+              </a:rPr>
+              <a:t> </a:t>
+            </a:r>
+            <a:r>
+              <a:rPr lang="ko-KR" sz="1800">
+                <a:latin typeface="맑은 고딕" charset="0"/>
+                <a:ea typeface="맑은 고딕" charset="0"/>
+              </a:rPr>
+              <a:t>이제 </a:t>
+            </a:r>
+            <a:r>
+              <a:rPr sz="1800">
+                <a:latin typeface="맑은 고딕" charset="0"/>
+                <a:ea typeface="맑은 고딕" charset="0"/>
+              </a:rPr>
+              <a:t>Main Camera 오브젝트를 </a:t>
+            </a:r>
+            <a:r>
+              <a:rPr sz="1800">
+                <a:latin typeface="맑은 고딕" charset="0"/>
+                <a:ea typeface="맑은 고딕" charset="0"/>
+              </a:rPr>
+              <a:t>Scout</a:t>
+            </a:r>
+            <a:r>
+              <a:rPr sz="1800">
+                <a:latin typeface="맑은 고딕" charset="0"/>
+                <a:ea typeface="맑은 고딕" charset="0"/>
+              </a:rPr>
+              <a:t> Robot</a:t>
+            </a:r>
+            <a:r>
+              <a:rPr sz="1800">
+                <a:latin typeface="맑은 고딕" charset="0"/>
+                <a:ea typeface="맑은 고딕" charset="0"/>
+              </a:rPr>
+              <a:t> </a:t>
+            </a:r>
+            <a:r>
+              <a:rPr sz="1800">
+                <a:latin typeface="맑은 고딕" charset="0"/>
+                <a:ea typeface="맑은 고딕" charset="0"/>
+              </a:rPr>
+              <a:t>오브젝트의</a:t>
+            </a:r>
+            <a:r>
+              <a:rPr sz="1800">
+                <a:latin typeface="맑은 고딕" charset="0"/>
+                <a:ea typeface="맑은 고딕" charset="0"/>
+              </a:rPr>
+              <a:t> 하위 </a:t>
+            </a:r>
+            <a:r>
+              <a:rPr sz="1800">
+                <a:latin typeface="맑은 고딕" charset="0"/>
+                <a:ea typeface="맑은 고딕" charset="0"/>
+              </a:rPr>
+              <a:t>오브젝트로</a:t>
+            </a:r>
+            <a:r>
+              <a:rPr sz="1800">
+                <a:latin typeface="맑은 고딕" charset="0"/>
+                <a:ea typeface="맑은 고딕" charset="0"/>
+              </a:rPr>
+              <a:t> </a:t>
+            </a:r>
+            <a:r>
+              <a:rPr sz="1800">
+                <a:latin typeface="맑은 고딕" charset="0"/>
+                <a:ea typeface="맑은 고딕" charset="0"/>
+              </a:rPr>
+              <a:t>넣어줍니다.</a:t>
             </a:r>
             <a:endParaRPr lang="ko-KR" altLang="en-US" sz="1800">
               <a:latin typeface="맑은 고딕" charset="0"/>
@@ -8666,7 +9209,193 @@
       </p:sp>
       <p:pic>
         <p:nvPicPr>
-          <p:cNvPr id="26" name="그림 20"/>
+          <p:cNvPr id="59" name="그림 13" descr="C:/Users/Admin1/AppData/Roaming/PolarisOffice/ETemp/29716_8262256/fImage78881816334.png"/>
+          <p:cNvPicPr>
+            <a:picLocks noChangeAspect="1"/>
+          </p:cNvPicPr>
+          <p:nvPr/>
+        </p:nvPicPr>
+        <p:blipFill rotWithShape="1">
+          <a:blip r:embed="rId5" cstate="print">
+            <a:extLst>
+              <a:ext uri="{28A0092B-C50C-407E-A947-70E740481C1C}">
+                <a14:useLocalDpi xmlns:a14="http://schemas.microsoft.com/office/drawing/2010/main" val="0"/>
+              </a:ext>
+            </a:extLst>
+          </a:blip>
+          <a:stretch>
+            <a:fillRect/>
+          </a:stretch>
+        </p:blipFill>
+        <p:spPr>
+          <a:xfrm rot="0">
+            <a:off x="2635885" y="3902710"/>
+            <a:ext cx="2731135" cy="1171575"/>
+          </a:xfrm>
+          <a:prstGeom prst="roundRect"/>
+          <a:solidFill>
+            <a:srgbClr val="EDEDED"/>
+          </a:solidFill>
+        </p:spPr>
+      </p:pic>
+      <p:pic>
+        <p:nvPicPr>
+          <p:cNvPr id="60" name="그림 16" descr="C:/Users/Admin1/AppData/Roaming/PolarisOffice/ETemp/29716_8262256/fImage84131826500.png"/>
+          <p:cNvPicPr>
+            <a:picLocks noChangeAspect="1"/>
+          </p:cNvPicPr>
+          <p:nvPr/>
+        </p:nvPicPr>
+        <p:blipFill rotWithShape="1">
+          <a:blip r:embed="rId6" cstate="print">
+            <a:extLst>
+              <a:ext uri="{28A0092B-C50C-407E-A947-70E740481C1C}">
+                <a14:useLocalDpi xmlns:a14="http://schemas.microsoft.com/office/drawing/2010/main" val="0"/>
+              </a:ext>
+            </a:extLst>
+          </a:blip>
+          <a:stretch>
+            <a:fillRect/>
+          </a:stretch>
+        </p:blipFill>
+        <p:spPr>
+          <a:xfrm rot="0">
+            <a:off x="1231900" y="3893820"/>
+            <a:ext cx="1310005" cy="1172210"/>
+          </a:xfrm>
+          <a:prstGeom prst="roundRect"/>
+          <a:solidFill>
+            <a:srgbClr val="EDEDED"/>
+          </a:solidFill>
+        </p:spPr>
+      </p:pic>
+      <p:pic>
+        <p:nvPicPr>
+          <p:cNvPr id="61" name="그림 20" descr="C:/Users/Admin1/AppData/Roaming/PolarisOffice/ETemp/29716_8262256/fImage2242171946962.png"/>
+          <p:cNvPicPr>
+            <a:picLocks noChangeAspect="1"/>
+          </p:cNvPicPr>
+          <p:nvPr/>
+        </p:nvPicPr>
+        <p:blipFill rotWithShape="1">
+          <a:blip r:embed="rId4" cstate="hqprint">
+            <a:extLst>
+              <a:ext uri="{28A0092B-C50C-407E-A947-70E740481C1C}">
+                <a14:useLocalDpi xmlns:a14="http://schemas.microsoft.com/office/drawing/2010/main"/>
+              </a:ext>
+            </a:extLst>
+          </a:blip>
+          <a:stretch>
+            <a:fillRect/>
+          </a:stretch>
+        </p:blipFill>
+        <p:spPr>
+          <a:xfrm rot="10800000">
+            <a:off x="2265045" y="4307205"/>
+            <a:ext cx="628015" cy="354330"/>
+          </a:xfrm>
+          <a:prstGeom prst="rect"/>
+          <a:noFill/>
+        </p:spPr>
+      </p:pic>
+      <p:pic>
+        <p:nvPicPr>
+          <p:cNvPr id="62" name="그림 21" descr="C:/Users/Admin1/AppData/Roaming/PolarisOffice/ETemp/29716_8262256/fImage149321859169.png"/>
+          <p:cNvPicPr>
+            <a:picLocks noChangeAspect="1"/>
+          </p:cNvPicPr>
+          <p:nvPr/>
+        </p:nvPicPr>
+        <p:blipFill rotWithShape="1">
+          <a:blip r:embed="rId7" cstate="print">
+            <a:extLst>
+              <a:ext uri="{28A0092B-C50C-407E-A947-70E740481C1C}">
+                <a14:useLocalDpi xmlns:a14="http://schemas.microsoft.com/office/drawing/2010/main" val="0"/>
+              </a:ext>
+            </a:extLst>
+          </a:blip>
+          <a:stretch>
+            <a:fillRect/>
+          </a:stretch>
+        </p:blipFill>
+        <p:spPr>
+          <a:xfrm rot="0">
+            <a:off x="8191500" y="1447165"/>
+            <a:ext cx="2773045" cy="1111885"/>
+          </a:xfrm>
+          <a:prstGeom prst="roundRect"/>
+          <a:solidFill>
+            <a:srgbClr val="EDEDED"/>
+          </a:solidFill>
+        </p:spPr>
+      </p:pic>
+      <p:pic>
+        <p:nvPicPr>
+          <p:cNvPr id="63" name="그림 24" descr="C:/Users/Admin1/AppData/Roaming/PolarisOffice/ETemp/29716_8262256/fImage83981865724.png"/>
+          <p:cNvPicPr>
+            <a:picLocks noChangeAspect="1"/>
+          </p:cNvPicPr>
+          <p:nvPr/>
+        </p:nvPicPr>
+        <p:blipFill rotWithShape="1">
+          <a:blip r:embed="rId8" cstate="print">
+            <a:extLst>
+              <a:ext uri="{28A0092B-C50C-407E-A947-70E740481C1C}">
+                <a14:useLocalDpi xmlns:a14="http://schemas.microsoft.com/office/drawing/2010/main" val="0"/>
+              </a:ext>
+            </a:extLst>
+          </a:blip>
+          <a:stretch>
+            <a:fillRect/>
+          </a:stretch>
+        </p:blipFill>
+        <p:spPr>
+          <a:xfrm rot="0">
+            <a:off x="6819900" y="1436370"/>
+            <a:ext cx="1243330" cy="1130935"/>
+          </a:xfrm>
+          <a:prstGeom prst="roundRect"/>
+          <a:solidFill>
+            <a:srgbClr val="EDEDED"/>
+          </a:solidFill>
+        </p:spPr>
+      </p:pic>
+      <p:cxnSp>
+        <p:nvCxnSpPr>
+          <p:cNvPr id="64" name="도형 27"/>
+          <p:cNvCxnSpPr/>
+          <p:nvPr/>
+        </p:nvCxnSpPr>
+        <p:spPr>
+          <a:xfrm rot="0" flipH="1" flipV="1">
+            <a:off x="7959090" y="1911985"/>
+            <a:ext cx="1379220" cy="207645"/>
+          </a:xfrm>
+          <a:prstGeom prst="straightConnector1"/>
+          <a:ln w="6350" cap="flat" cmpd="sng">
+            <a:prstDash/>
+            <a:headEnd type="none" w="med" len="med"/>
+            <a:tailEnd type="triangle" w="med" len="med"/>
+          </a:ln>
+        </p:spPr>
+        <p:style>
+          <a:lnRef idx="1">
+            <a:schemeClr val="accent1"/>
+          </a:lnRef>
+          <a:fillRef idx="0">
+            <a:schemeClr val="accent1"/>
+          </a:fillRef>
+          <a:effectRef idx="0">
+            <a:schemeClr val="accent1"/>
+          </a:effectRef>
+          <a:fontRef idx="minor">
+            <a:schemeClr val="tx1"/>
+          </a:fontRef>
+        </p:style>
+      </p:cxnSp>
+      <p:pic>
+        <p:nvPicPr>
+          <p:cNvPr id="65" name="그림 28" descr="C:/Users/Admin1/AppData/Roaming/PolarisOffice/ETemp/29716_8262256/fImage48931881478.png"/>
           <p:cNvPicPr>
             <a:picLocks noChangeAspect="1"/>
           </p:cNvPicPr>
@@ -8686,8 +9415,8 @@
         </p:blipFill>
         <p:spPr>
           <a:xfrm rot="0">
-            <a:off x="1224915" y="1476375"/>
-            <a:ext cx="4137660" cy="2198370"/>
+            <a:off x="6805295" y="4005580"/>
+            <a:ext cx="4152265" cy="1344295"/>
           </a:xfrm>
           <a:prstGeom prst="roundRect"/>
           <a:solidFill>
@@ -8695,139 +9424,6 @@
           </a:solidFill>
         </p:spPr>
       </p:pic>
-      <p:pic>
-        <p:nvPicPr>
-          <p:cNvPr id="29" name="그림 47"/>
-          <p:cNvPicPr>
-            <a:picLocks noChangeAspect="1"/>
-          </p:cNvPicPr>
-          <p:nvPr/>
-        </p:nvPicPr>
-        <p:blipFill rotWithShape="1">
-          <a:blip r:embed="rId11" cstate="hqprint">
-            <a:extLst>
-              <a:ext uri="{28A0092B-C50C-407E-A947-70E740481C1C}">
-                <a14:useLocalDpi xmlns:a14="http://schemas.microsoft.com/office/drawing/2010/main"/>
-              </a:ext>
-            </a:extLst>
-          </a:blip>
-          <a:stretch>
-            <a:fillRect/>
-          </a:stretch>
-        </p:blipFill>
-        <p:spPr>
-          <a:xfrm rot="0">
-            <a:off x="6840855" y="3903345"/>
-            <a:ext cx="4044950" cy="1241425"/>
-          </a:xfrm>
-          <a:prstGeom prst="roundRect"/>
-          <a:solidFill>
-            <a:srgbClr val="EDEDED"/>
-          </a:solidFill>
-        </p:spPr>
-      </p:pic>
-      <p:sp>
-        <p:nvSpPr>
-          <p:cNvPr id="30" name="텍스트 상자 48"/>
-          <p:cNvSpPr txBox="1">
-            <a:spLocks/>
-          </p:cNvSpPr>
-          <p:nvPr/>
-        </p:nvSpPr>
-        <p:spPr>
-          <a:xfrm rot="0">
-            <a:off x="6828790" y="5200015"/>
-            <a:ext cx="4057650" cy="955040"/>
-          </a:xfrm>
-          <a:prstGeom prst="rect"/>
-          <a:noFill/>
-          <a:ln w="0">
-            <a:noFill/>
-            <a:prstDash/>
-          </a:ln>
-        </p:spPr>
-        <p:txBody>
-          <a:bodyPr wrap="square" lIns="89535" tIns="46355" rIns="89535" bIns="46355" numCol="1" vert="horz" anchor="t">
-            <a:spAutoFit/>
-          </a:bodyPr>
-          <a:lstStyle/>
-          <a:p>
-            <a:pPr marL="0" indent="0" rtl="0" algn="l" defTabSz="914400" eaLnBrk="1" latinLnBrk="0" hangingPunct="1">
-              <a:buFontTx/>
-              <a:buNone/>
-            </a:pPr>
-            <a:r>
-              <a:rPr lang="ko-KR" sz="2000" b="1">
-                <a:solidFill>
-                  <a:srgbClr val="0611F2"/>
-                </a:solidFill>
-                <a:latin typeface="맑은 고딕" charset="0"/>
-                <a:ea typeface="맑은 고딕" charset="0"/>
-              </a:rPr>
-              <a:t>33</a:t>
-            </a:r>
-            <a:r>
-              <a:rPr sz="2000" b="1">
-                <a:solidFill>
-                  <a:srgbClr val="0611F2"/>
-                </a:solidFill>
-                <a:latin typeface="맑은 고딕" charset="0"/>
-                <a:ea typeface="맑은 고딕" charset="0"/>
-              </a:rPr>
-              <a:t>.</a:t>
-            </a:r>
-            <a:r>
-              <a:rPr lang="ko-KR" sz="2000" b="1">
-                <a:solidFill>
-                  <a:srgbClr val="0611F2"/>
-                </a:solidFill>
-                <a:latin typeface="맑은 고딕" charset="0"/>
-                <a:ea typeface="맑은 고딕" charset="0"/>
-              </a:rPr>
-              <a:t> </a:t>
-            </a:r>
-            <a:r>
-              <a:rPr lang="ko-KR" sz="1800">
-                <a:latin typeface="맑은 고딕" charset="0"/>
-                <a:ea typeface="맑은 고딕" charset="0"/>
-              </a:rPr>
-              <a:t>그런 다음 Physic Material를 </a:t>
-            </a:r>
-            <a:r>
-              <a:rPr lang="ko-KR" sz="1800">
-                <a:latin typeface="맑은 고딕" charset="0"/>
-                <a:ea typeface="맑은 고딕" charset="0"/>
-              </a:rPr>
-              <a:t>선택하고</a:t>
-            </a:r>
-            <a:r>
-              <a:rPr lang="ko-KR" sz="1800">
-                <a:latin typeface="맑은 고딕" charset="0"/>
-                <a:ea typeface="맑은 고딕" charset="0"/>
-              </a:rPr>
-              <a:t> Bounciness값과 Bounce </a:t>
-            </a:r>
-            <a:r>
-              <a:rPr lang="ko-KR" sz="1800">
-                <a:latin typeface="맑은 고딕" charset="0"/>
-                <a:ea typeface="맑은 고딕" charset="0"/>
-              </a:rPr>
-              <a:t>Combine값을</a:t>
-            </a:r>
-            <a:r>
-              <a:rPr lang="ko-KR" sz="1800">
-                <a:latin typeface="맑은 고딕" charset="0"/>
-                <a:ea typeface="맑은 고딕" charset="0"/>
-              </a:rPr>
-              <a:t> 최대로 설정합니다. </a:t>
-            </a:r>
-            <a:endParaRPr lang="ko-KR" altLang="en-US" sz="1800">
-              <a:latin typeface="맑은 고딕" charset="0"/>
-              <a:ea typeface="맑은 고딕" charset="0"/>
-            </a:endParaRPr>
-          </a:p>
-        </p:txBody>
-      </p:sp>
     </p:spTree>
   </p:cSld>
   <p:clrMapOvr>

</xml_diff>

<commit_message>
Animation Event Tutorial Renewal
- Physical PPT data update

- Delete and add resource data
</commit_message>
<xml_diff>
--- a/Assets/Physics/PPT Data/Physics Example.pptx
+++ b/Assets/Physics/PPT Data/Physics Example.pptx
@@ -2,7 +2,7 @@
 <file path=ppt/presentation.xml><?xml version="1.0" encoding="utf-8"?>
 <p:presentation xmlns:a="http://schemas.openxmlformats.org/drawingml/2006/main" xmlns:r="http://schemas.openxmlformats.org/officeDocument/2006/relationships" xmlns:p="http://schemas.openxmlformats.org/presentationml/2006/main" xmlns:p14="http://schemas.microsoft.com/office/powerpoint/2010/main" saveSubsetFonts="1" firstSlideNum="0">
   <p:sldMasterIdLst>
-    <p:sldMasterId id="2147485488" r:id="rId12"/>
+    <p:sldMasterId id="2147485504" r:id="rId12"/>
   </p:sldMasterIdLst>
   <p:notesMasterIdLst>
     <p:notesMasterId r:id="rId14"/>
@@ -13,7 +13,11 @@
     <p:sldId id="289" r:id="rId18"/>
     <p:sldId id="290" r:id="rId19"/>
     <p:sldId id="291" r:id="rId20"/>
-    <p:sldId id="287" r:id="rId21"/>
+    <p:sldId id="292" r:id="rId21"/>
+    <p:sldId id="293" r:id="rId22"/>
+    <p:sldId id="294" r:id="rId23"/>
+    <p:sldId id="295" r:id="rId24"/>
+    <p:sldId id="287" r:id="rId25"/>
   </p:sldIdLst>
   <p:sldSz cx="12192000" cy="6858000"/>
   <p:notesSz cx="6858000" cy="9144000"/>
@@ -6075,6 +6079,409 @@
 </p:sld>
 </file>
 
+<file path=ppt/slides/slide10.xml><?xml version="1.0" encoding="utf-8"?>
+<p:sld xmlns:a="http://schemas.openxmlformats.org/drawingml/2006/main" xmlns:r="http://schemas.openxmlformats.org/officeDocument/2006/relationships" xmlns:p="http://schemas.openxmlformats.org/presentationml/2006/main" xmlns:p14="http://schemas.microsoft.com/office/powerpoint/2010/main">
+  <p:cSld>
+    <p:spTree>
+      <p:nvGrpSpPr>
+        <p:cNvPr id="1" name=""/>
+        <p:cNvGrpSpPr/>
+        <p:nvPr/>
+      </p:nvGrpSpPr>
+      <p:grpSpPr>
+        <a:xfrm>
+          <a:off x="0" y="0"/>
+          <a:ext cx="0" cy="0"/>
+          <a:chOff x="0" y="0"/>
+          <a:chExt cx="0" cy="0"/>
+        </a:xfrm>
+      </p:grpSpPr>
+      <p:sp>
+        <p:nvSpPr>
+          <p:cNvPr id="2" name="Rect 0"/>
+          <p:cNvSpPr txBox="1">
+            <a:spLocks/>
+          </p:cNvSpPr>
+          <p:nvPr/>
+        </p:nvSpPr>
+        <p:spPr>
+          <a:xfrm>
+            <a:off x="4333240" y="393700"/>
+            <a:ext cx="3530600" cy="478155"/>
+          </a:xfrm>
+          <a:prstGeom prst="rect"/>
+          <a:noFill/>
+          <a:ln w="0">
+            <a:noFill/>
+            <a:prstDash/>
+          </a:ln>
+        </p:spPr>
+        <p:txBody>
+          <a:bodyPr wrap="square" lIns="89535" tIns="46355" rIns="89535" bIns="46355" numCol="1" vert="horz" anchor="t">
+            <a:spAutoFit/>
+          </a:bodyPr>
+          <a:lstStyle/>
+          <a:p>
+            <a:pPr marL="0" indent="0" rtl="0" algn="ctr" defTabSz="914400" eaLnBrk="1" latinLnBrk="0" hangingPunct="1">
+              <a:buFontTx/>
+              <a:buNone/>
+            </a:pPr>
+            <a:r>
+              <a:rPr lang="ko-KR" sz="2500" b="1">
+                <a:solidFill>
+                  <a:schemeClr val="tx1"/>
+                </a:solidFill>
+                <a:latin typeface="나눔바른고딕" charset="0"/>
+                <a:ea typeface="나눔바른고딕" charset="0"/>
+              </a:rPr>
+              <a:t>열두</a:t>
+            </a:r>
+            <a:r>
+              <a:rPr lang="ko-KR" sz="2500" b="1">
+                <a:solidFill>
+                  <a:schemeClr val="tx1"/>
+                </a:solidFill>
+                <a:latin typeface="나눔바른고딕" charset="0"/>
+                <a:ea typeface="나눔바른고딕" charset="0"/>
+              </a:rPr>
+              <a:t> 번째 튜토리얼</a:t>
+            </a:r>
+            <a:endParaRPr lang="ko-KR" altLang="en-US" sz="2500" b="1">
+              <a:solidFill>
+                <a:schemeClr val="tx1"/>
+              </a:solidFill>
+              <a:latin typeface="나눔바른고딕" charset="0"/>
+              <a:ea typeface="나눔바른고딕" charset="0"/>
+            </a:endParaRPr>
+          </a:p>
+        </p:txBody>
+      </p:sp>
+      <p:pic>
+        <p:nvPicPr>
+          <p:cNvPr id="61" name="그림 24"/>
+          <p:cNvPicPr>
+            <a:picLocks noChangeAspect="1"/>
+          </p:cNvPicPr>
+          <p:nvPr/>
+        </p:nvPicPr>
+        <p:blipFill rotWithShape="1">
+          <a:blip r:embed="rId4" cstate="print">
+            <a:extLst>
+              <a:ext uri="{28A0092B-C50C-407E-A947-70E740481C1C}">
+                <a14:useLocalDpi xmlns:a14="http://schemas.microsoft.com/office/drawing/2010/main" val="0"/>
+              </a:ext>
+            </a:extLst>
+          </a:blip>
+          <a:stretch>
+            <a:fillRect/>
+          </a:stretch>
+        </p:blipFill>
+        <p:spPr>
+          <a:xfrm rot="0">
+            <a:off x="7040245" y="1402715"/>
+            <a:ext cx="3983355" cy="1395095"/>
+          </a:xfrm>
+          <a:prstGeom prst="roundRect"/>
+          <a:solidFill>
+            <a:srgbClr val="EDEDED"/>
+          </a:solidFill>
+        </p:spPr>
+      </p:pic>
+      <p:pic>
+        <p:nvPicPr>
+          <p:cNvPr id="62" name="그림 27"/>
+          <p:cNvPicPr>
+            <a:picLocks noChangeAspect="1"/>
+          </p:cNvPicPr>
+          <p:nvPr/>
+        </p:nvPicPr>
+        <p:blipFill rotWithShape="1">
+          <a:blip r:embed="rId5" cstate="print">
+            <a:extLst>
+              <a:ext uri="{28A0092B-C50C-407E-A947-70E740481C1C}">
+                <a14:useLocalDpi xmlns:a14="http://schemas.microsoft.com/office/drawing/2010/main" val="0"/>
+              </a:ext>
+            </a:extLst>
+          </a:blip>
+          <a:stretch>
+            <a:fillRect/>
+          </a:stretch>
+        </p:blipFill>
+        <p:spPr>
+          <a:xfrm rot="0">
+            <a:off x="7039610" y="2927350"/>
+            <a:ext cx="3992880" cy="1056005"/>
+          </a:xfrm>
+          <a:prstGeom prst="roundRect"/>
+          <a:solidFill>
+            <a:srgbClr val="EDEDED"/>
+          </a:solidFill>
+        </p:spPr>
+      </p:pic>
+      <p:sp>
+        <p:nvSpPr>
+          <p:cNvPr id="63" name="텍스트 상자 30"/>
+          <p:cNvSpPr txBox="1">
+            <a:spLocks/>
+          </p:cNvSpPr>
+          <p:nvPr/>
+        </p:nvSpPr>
+        <p:spPr>
+          <a:xfrm>
+            <a:off x="7052945" y="4088765"/>
+            <a:ext cx="3971925" cy="2061845"/>
+          </a:xfrm>
+          <a:prstGeom prst="rect"/>
+          <a:noFill/>
+          <a:ln w="0">
+            <a:noFill/>
+            <a:prstDash/>
+          </a:ln>
+        </p:spPr>
+        <p:txBody>
+          <a:bodyPr wrap="square" lIns="89535" tIns="46355" rIns="89535" bIns="46355" numCol="1" vert="horz" anchor="t">
+            <a:spAutoFit/>
+          </a:bodyPr>
+          <a:lstStyle/>
+          <a:p>
+            <a:pPr marL="0" indent="0" rtl="0" algn="l" defTabSz="914400" eaLnBrk="1" latinLnBrk="0" hangingPunct="1">
+              <a:buFontTx/>
+              <a:buNone/>
+            </a:pPr>
+            <a:r>
+              <a:rPr lang="ko-KR" sz="2000" b="1">
+                <a:solidFill>
+                  <a:srgbClr val="0611F2"/>
+                </a:solidFill>
+                <a:latin typeface="맑은 고딕" charset="0"/>
+                <a:ea typeface="맑은 고딕" charset="0"/>
+              </a:rPr>
+              <a:t>30</a:t>
+            </a:r>
+            <a:r>
+              <a:rPr sz="2000" b="1">
+                <a:solidFill>
+                  <a:srgbClr val="0611F2"/>
+                </a:solidFill>
+                <a:latin typeface="맑은 고딕" charset="0"/>
+                <a:ea typeface="맑은 고딕" charset="0"/>
+              </a:rPr>
+              <a:t>. </a:t>
+            </a:r>
+            <a:r>
+              <a:rPr lang="ko-KR" sz="1800">
+                <a:latin typeface="맑은 고딕" charset="0"/>
+                <a:ea typeface="맑은 고딕" charset="0"/>
+              </a:rPr>
+              <a:t>그다음 Project 폴더에 있는 Physic Material 파일에 Physic Material을 선택합니다.</a:t>
+            </a:r>
+            <a:endParaRPr lang="ko-KR" altLang="en-US" sz="1800">
+              <a:latin typeface="맑은 고딕" charset="0"/>
+              <a:ea typeface="맑은 고딕" charset="0"/>
+            </a:endParaRPr>
+          </a:p>
+          <a:p>
+            <a:pPr marL="0" indent="0" rtl="0" algn="l" defTabSz="914400" eaLnBrk="1" latinLnBrk="0" hangingPunct="1">
+              <a:buFontTx/>
+              <a:buNone/>
+            </a:pPr>
+            <a:endParaRPr lang="ko-KR" altLang="en-US" sz="1800">
+              <a:latin typeface="맑은 고딕" charset="0"/>
+              <a:ea typeface="맑은 고딕" charset="0"/>
+            </a:endParaRPr>
+          </a:p>
+          <a:p>
+            <a:pPr marL="0" indent="0" rtl="0" algn="l" defTabSz="914400" eaLnBrk="1" latinLnBrk="0" hangingPunct="1">
+              <a:buFontTx/>
+              <a:buNone/>
+            </a:pPr>
+            <a:r>
+              <a:rPr lang="ko-KR" sz="1800">
+                <a:latin typeface="맑은 고딕" charset="0"/>
+                <a:ea typeface="맑은 고딕" charset="0"/>
+              </a:rPr>
+              <a:t>그런 다음 Billiard Ball 오브젝트에 있는 Sphere Collider 컴포넌트에 Physic Material을 넣어줍니다.</a:t>
+            </a:r>
+            <a:endParaRPr lang="ko-KR" altLang="en-US" sz="1800">
+              <a:latin typeface="맑은 고딕" charset="0"/>
+              <a:ea typeface="맑은 고딕" charset="0"/>
+            </a:endParaRPr>
+          </a:p>
+        </p:txBody>
+      </p:sp>
+      <p:cxnSp>
+        <p:nvCxnSpPr>
+          <p:cNvPr id="64" name="도형 31"/>
+          <p:cNvCxnSpPr/>
+          <p:nvPr/>
+        </p:nvCxnSpPr>
+        <p:spPr>
+          <a:xfrm rot="0" flipV="1">
+            <a:off x="8217535" y="2207895"/>
+            <a:ext cx="2667635" cy="996315"/>
+          </a:xfrm>
+          <a:prstGeom prst="straightConnector1"/>
+          <a:ln w="6350" cap="flat" cmpd="sng">
+            <a:prstDash/>
+            <a:headEnd type="none" w="med" len="med"/>
+            <a:tailEnd type="triangle" w="med" len="med"/>
+          </a:ln>
+        </p:spPr>
+        <p:style>
+          <a:lnRef idx="1">
+            <a:schemeClr val="accent1"/>
+          </a:lnRef>
+          <a:fillRef idx="0">
+            <a:schemeClr val="accent1"/>
+          </a:fillRef>
+          <a:effectRef idx="0">
+            <a:schemeClr val="accent1"/>
+          </a:effectRef>
+          <a:fontRef idx="minor">
+            <a:schemeClr val="tx1"/>
+          </a:fontRef>
+        </p:style>
+      </p:cxnSp>
+      <p:sp>
+        <p:nvSpPr>
+          <p:cNvPr id="65" name="텍스트 상자 15"/>
+          <p:cNvSpPr txBox="1">
+            <a:spLocks/>
+          </p:cNvSpPr>
+          <p:nvPr/>
+        </p:nvSpPr>
+        <p:spPr>
+          <a:xfrm rot="0">
+            <a:off x="1320165" y="5471160"/>
+            <a:ext cx="4038600" cy="677545"/>
+          </a:xfrm>
+          <a:prstGeom prst="rect"/>
+          <a:noFill/>
+          <a:ln w="0">
+            <a:noFill/>
+            <a:prstDash/>
+          </a:ln>
+        </p:spPr>
+        <p:txBody>
+          <a:bodyPr wrap="square" lIns="89535" tIns="46355" rIns="89535" bIns="46355" numCol="1" vert="horz" anchor="t">
+            <a:spAutoFit/>
+          </a:bodyPr>
+          <a:lstStyle/>
+          <a:p>
+            <a:pPr marL="0" indent="0" rtl="0" algn="l" defTabSz="914400" eaLnBrk="1" latinLnBrk="0" hangingPunct="1">
+              <a:buFontTx/>
+              <a:buNone/>
+            </a:pPr>
+            <a:r>
+              <a:rPr lang="ko-KR" sz="2000" b="1">
+                <a:solidFill>
+                  <a:srgbClr val="0611F2"/>
+                </a:solidFill>
+                <a:latin typeface="맑은 고딕" charset="0"/>
+                <a:ea typeface="맑은 고딕" charset="0"/>
+              </a:rPr>
+              <a:t>28</a:t>
+            </a:r>
+            <a:r>
+              <a:rPr sz="2000" b="1">
+                <a:solidFill>
+                  <a:srgbClr val="0611F2"/>
+                </a:solidFill>
+                <a:latin typeface="맑은 고딕" charset="0"/>
+                <a:ea typeface="맑은 고딕" charset="0"/>
+              </a:rPr>
+              <a:t>.</a:t>
+            </a:r>
+            <a:r>
+              <a:rPr sz="2000" b="1">
+                <a:solidFill>
+                  <a:srgbClr val="0611F2"/>
+                </a:solidFill>
+                <a:latin typeface="맑은 고딕" charset="0"/>
+                <a:ea typeface="맑은 고딕" charset="0"/>
+              </a:rPr>
+              <a:t> </a:t>
+            </a:r>
+            <a:r>
+              <a:rPr lang="ko-KR" sz="1800">
+                <a:latin typeface="맑은 고딕" charset="0"/>
+                <a:ea typeface="맑은 고딕" charset="0"/>
+              </a:rPr>
+              <a:t>그리고 Project 폴더에서 Physic </a:t>
+            </a:r>
+            <a:r>
+              <a:rPr lang="ko-KR" sz="1800">
+                <a:latin typeface="맑은 고딕" charset="0"/>
+                <a:ea typeface="맑은 고딕" charset="0"/>
+              </a:rPr>
+              <a:t>Material을</a:t>
+            </a:r>
+            <a:r>
+              <a:rPr lang="ko-KR" sz="1800">
+                <a:latin typeface="맑은 고딕" charset="0"/>
+                <a:ea typeface="맑은 고딕" charset="0"/>
+              </a:rPr>
+              <a:t> 생성합니다.</a:t>
+            </a:r>
+            <a:endParaRPr lang="ko-KR" altLang="en-US" sz="1800">
+              <a:latin typeface="맑은 고딕" charset="0"/>
+              <a:ea typeface="맑은 고딕" charset="0"/>
+            </a:endParaRPr>
+          </a:p>
+        </p:txBody>
+      </p:sp>
+      <p:pic>
+        <p:nvPicPr>
+          <p:cNvPr id="66" name="그림 16" descr="C:/Users/Admin1/AppData/Roaming/PolarisOffice/ETemp/34236_8196696/fImage415872006500.png"/>
+          <p:cNvPicPr>
+            <a:picLocks noChangeAspect="1"/>
+          </p:cNvPicPr>
+          <p:nvPr/>
+        </p:nvPicPr>
+        <p:blipFill rotWithShape="1">
+          <a:blip r:embed="rId6" cstate="hqprint">
+            <a:extLst>
+              <a:ext uri="{28A0092B-C50C-407E-A947-70E740481C1C}">
+                <a14:useLocalDpi xmlns:a14="http://schemas.microsoft.com/office/drawing/2010/main"/>
+              </a:ext>
+            </a:extLst>
+          </a:blip>
+          <a:stretch>
+            <a:fillRect/>
+          </a:stretch>
+        </p:blipFill>
+        <p:spPr>
+          <a:xfrm rot="0">
+            <a:off x="1318260" y="1455420"/>
+            <a:ext cx="4051935" cy="3872865"/>
+          </a:xfrm>
+          <a:prstGeom prst="rect"/>
+          <a:noFill/>
+        </p:spPr>
+      </p:pic>
+    </p:spTree>
+  </p:cSld>
+  <p:clrMapOvr>
+    <a:masterClrMapping/>
+  </p:clrMapOvr>
+  <mc:AlternateContent xmlns:mc="http://schemas.openxmlformats.org/markup-compatibility/2006">
+    <mc:Choice xmlns:p14="http://schemas.microsoft.com/office/powerpoint/2010/main" Requires="p14">
+      <p:transition spd="slow" p14:dur="1000"/>
+    </mc:Choice>
+    <mc:Fallback>
+      <p:transition spd="slow"/>
+    </mc:Fallback>
+  </mc:AlternateContent>
+  <p:timing>
+    <p:tnLst>
+      <p:par>
+        <p:cTn id="1" dur="indefinite" restart="never" nodeType="tmRoot"/>
+      </p:par>
+    </p:tnLst>
+  </p:timing>
+</p:sld>
+</file>
+
 <file path=ppt/slides/slide2.xml><?xml version="1.0" encoding="utf-8"?>
 <p:sld xmlns:a="http://schemas.openxmlformats.org/drawingml/2006/main" xmlns:r="http://schemas.openxmlformats.org/officeDocument/2006/relationships" xmlns:p="http://schemas.openxmlformats.org/presentationml/2006/main" xmlns:p14="http://schemas.microsoft.com/office/powerpoint/2010/main">
   <p:cSld>
@@ -7733,8 +8140,8 @@
         </p:nvSpPr>
         <p:spPr>
           <a:xfrm rot="0">
-            <a:off x="6821805" y="2658745"/>
-            <a:ext cx="4144010" cy="1231265"/>
+            <a:off x="6821805" y="2675890"/>
+            <a:ext cx="4144645" cy="1231900"/>
           </a:xfrm>
           <a:prstGeom prst="rect"/>
           <a:noFill/>
@@ -7761,7 +8168,17 @@
                 <a:latin typeface="맑은 고딕" charset="0"/>
                 <a:ea typeface="맑은 고딕" charset="0"/>
               </a:rPr>
-              <a:t>1</a:t>
+              <a:t>12</a:t>
+            </a:r>
+            <a:r>
+              <a:rPr sz="2000" b="1">
+                <a:solidFill>
+                  <a:srgbClr val="0611F2"/>
+                </a:solidFill>
+                <a:latin typeface="맑은 고딕" charset="0"/>
+                <a:ea typeface="맑은 고딕" charset="0"/>
+              </a:rPr>
+              <a:t>.</a:t>
             </a:r>
             <a:r>
               <a:rPr lang="ko-KR" sz="2000" b="1">
@@ -7771,26 +8188,6 @@
                 <a:latin typeface="맑은 고딕" charset="0"/>
                 <a:ea typeface="맑은 고딕" charset="0"/>
               </a:rPr>
-              <a:t>2</a:t>
-            </a:r>
-            <a:r>
-              <a:rPr sz="2000" b="1">
-                <a:solidFill>
-                  <a:srgbClr val="0611F2"/>
-                </a:solidFill>
-                <a:latin typeface="맑은 고딕" charset="0"/>
-                <a:ea typeface="맑은 고딕" charset="0"/>
-              </a:rPr>
-              <a:t>.</a:t>
-            </a:r>
-            <a:r>
-              <a:rPr lang="ko-KR" sz="2000" b="1">
-                <a:solidFill>
-                  <a:srgbClr val="0611F2"/>
-                </a:solidFill>
-                <a:latin typeface="맑은 고딕" charset="0"/>
-                <a:ea typeface="맑은 고딕" charset="0"/>
-              </a:rPr>
               <a:t> </a:t>
             </a:r>
             <a:r>
@@ -7798,14 +8195,7 @@
                 <a:latin typeface="맑은 고딕" charset="0"/>
                 <a:ea typeface="맑은 고딕" charset="0"/>
               </a:rPr>
-              <a:t>그다음 Project 폴더 아래에 </a:t>
-            </a:r>
-            <a:r>
-              <a:rPr lang="ko-KR" sz="1800">
-                <a:latin typeface="맑은 고딕" charset="0"/>
-                <a:ea typeface="맑은 고딕" charset="0"/>
-              </a:rPr>
-              <a:t>있는 </a:t>
+              <a:t>그다음 Project 폴더 아래에 있는 </a:t>
             </a:r>
             <a:r>
               <a:rPr lang="ko-KR" sz="1800">
@@ -7826,35 +8216,14 @@
                 <a:latin typeface="맑은 고딕" charset="0"/>
                 <a:ea typeface="맑은 고딕" charset="0"/>
               </a:rPr>
-              <a:t>텍스처</a:t>
-            </a:r>
-            <a:r>
-              <a:rPr lang="ko-KR" sz="1800">
-                <a:latin typeface="맑은 고딕" charset="0"/>
-                <a:ea typeface="맑은 고딕" charset="0"/>
-              </a:rPr>
-              <a:t>를</a:t>
-            </a:r>
-            <a:r>
-              <a:rPr lang="ko-KR" sz="1800">
-                <a:latin typeface="맑은 고딕" charset="0"/>
-                <a:ea typeface="맑은 고딕" charset="0"/>
-              </a:rPr>
-              <a:t> </a:t>
-            </a:r>
-            <a:r>
-              <a:rPr lang="ko-KR" sz="1800">
-                <a:latin typeface="맑은 고딕" charset="0"/>
-                <a:ea typeface="맑은 고딕" charset="0"/>
-              </a:rPr>
-              <a:t>Billiard Ball (One)</a:t>
-            </a:r>
-            <a:r>
-              <a:rPr lang="ko-KR" sz="1800">
-                <a:latin typeface="맑은 고딕" charset="0"/>
-                <a:ea typeface="맑은 고딕" charset="0"/>
-              </a:rPr>
-              <a:t> </a:t>
+              <a:t>텍스처를</a:t>
+            </a:r>
+            <a:r>
+              <a:rPr lang="ko-KR" sz="1800">
+                <a:latin typeface="맑은 고딕" charset="0"/>
+                <a:ea typeface="맑은 고딕" charset="0"/>
+              </a:rPr>
+              <a:t> Billiard Ball (One) </a:t>
             </a:r>
             <a:r>
               <a:rPr lang="ko-KR" sz="1800">
@@ -7868,14 +8237,7 @@
                 <a:latin typeface="맑은 고딕" charset="0"/>
                 <a:ea typeface="맑은 고딕" charset="0"/>
               </a:rPr>
-              <a:t> </a:t>
-            </a:r>
-            <a:r>
-              <a:rPr lang="ko-KR" sz="1800">
-                <a:latin typeface="맑은 고딕" charset="0"/>
-                <a:ea typeface="맑은 고딕" charset="0"/>
-              </a:rPr>
-              <a:t>넣어줍니다.</a:t>
+              <a:t> 넣어줍니다.</a:t>
             </a:r>
             <a:endParaRPr lang="ko-KR" altLang="en-US" sz="1800">
               <a:latin typeface="맑은 고딕" charset="0"/>
@@ -7886,7 +8248,7 @@
       </p:sp>
       <p:pic>
         <p:nvPicPr>
-          <p:cNvPr id="44" name="그림 38" descr="C:/Users/Admin1/AppData/Roaming/PolarisOffice/ETemp/29812_9101400/fImage72651891478.png"/>
+          <p:cNvPr id="44" name="그림 38"/>
           <p:cNvPicPr>
             <a:picLocks noChangeAspect="1"/>
           </p:cNvPicPr>
@@ -7917,7 +8279,7 @@
       </p:pic>
       <p:pic>
         <p:nvPicPr>
-          <p:cNvPr id="45" name="그림 41" descr="C:/Users/Admin1/AppData/Roaming/PolarisOffice/ETemp/29812_9101400/fImage78671909358.png"/>
+          <p:cNvPr id="45" name="그림 41"/>
           <p:cNvPicPr>
             <a:picLocks noChangeAspect="1"/>
           </p:cNvPicPr>
@@ -8054,7 +8416,7 @@
       </p:sp>
       <p:pic>
         <p:nvPicPr>
-          <p:cNvPr id="47" name="그림 46" descr="C:/Users/Admin1/AppData/Roaming/PolarisOffice/ETemp/29812_9101400/fImage2242171946962.png"/>
+          <p:cNvPr id="47" name="그림 46"/>
           <p:cNvPicPr>
             <a:picLocks noChangeAspect="1"/>
           </p:cNvPicPr>
@@ -8216,7 +8578,7 @@
       </p:sp>
       <p:pic>
         <p:nvPicPr>
-          <p:cNvPr id="49" name="그림 2" descr="C:/Users/Admin1/AppData/Roaming/PolarisOffice/ETemp/29812_9101400/fImage12464964464.png"/>
+          <p:cNvPr id="49" name="그림 2"/>
           <p:cNvPicPr>
             <a:picLocks noChangeAspect="1"/>
           </p:cNvPicPr>
@@ -8247,17 +8609,17 @@
       </p:pic>
       <p:pic>
         <p:nvPicPr>
-          <p:cNvPr id="50" name="그림 3" descr="C:/Users/Admin1/AppData/Roaming/PolarisOffice/ETemp/29812_9101400/fImage149628741.png"/>
+          <p:cNvPr id="50" name="그림 3" descr="C:/Users/Admin1/AppData/Roaming/PolarisOffice/ETemp/34236_8196696/fImage149628741.png"/>
           <p:cNvPicPr>
             <a:picLocks noChangeAspect="1"/>
           </p:cNvPicPr>
           <p:nvPr/>
         </p:nvPicPr>
         <p:blipFill rotWithShape="1">
-          <a:blip r:embed="rId8" cstate="print">
+          <a:blip r:embed="rId8" cstate="hqprint">
             <a:extLst>
               <a:ext uri="{28A0092B-C50C-407E-A947-70E740481C1C}">
-                <a14:useLocalDpi xmlns:a14="http://schemas.microsoft.com/office/drawing/2010/main" val="0"/>
+                <a14:useLocalDpi xmlns:a14="http://schemas.microsoft.com/office/drawing/2010/main"/>
               </a:ext>
             </a:extLst>
           </a:blip>
@@ -8268,7 +8630,7 @@
         <p:spPr>
           <a:xfrm rot="0">
             <a:off x="8251825" y="1455420"/>
-            <a:ext cx="2714625" cy="1129030"/>
+            <a:ext cx="2715260" cy="1163955"/>
           </a:xfrm>
           <a:prstGeom prst="roundRect"/>
           <a:solidFill>
@@ -8278,17 +8640,17 @@
       </p:pic>
       <p:pic>
         <p:nvPicPr>
-          <p:cNvPr id="51" name="그림 6" descr="C:/Users/Admin1/AppData/Roaming/PolarisOffice/ETemp/29812_9101400/fImage7338888467.png"/>
+          <p:cNvPr id="51" name="그림 6" descr="C:/Users/Admin1/AppData/Roaming/PolarisOffice/ETemp/34236_8196696/fImage7338888467.png"/>
           <p:cNvPicPr>
             <a:picLocks noChangeAspect="1"/>
           </p:cNvPicPr>
           <p:nvPr/>
         </p:nvPicPr>
         <p:blipFill rotWithShape="1">
-          <a:blip r:embed="rId9" cstate="print">
+          <a:blip r:embed="rId9" cstate="hqprint">
             <a:extLst>
               <a:ext uri="{28A0092B-C50C-407E-A947-70E740481C1C}">
-                <a14:useLocalDpi xmlns:a14="http://schemas.microsoft.com/office/drawing/2010/main" val="0"/>
+                <a14:useLocalDpi xmlns:a14="http://schemas.microsoft.com/office/drawing/2010/main"/>
               </a:ext>
             </a:extLst>
           </a:blip>
@@ -8299,7 +8661,7 @@
         <p:spPr>
           <a:xfrm rot="0">
             <a:off x="6822440" y="1451610"/>
-            <a:ext cx="1327150" cy="1123950"/>
+            <a:ext cx="1327785" cy="1158240"/>
           </a:xfrm>
           <a:prstGeom prst="roundRect"/>
           <a:solidFill>
@@ -8342,7 +8704,7 @@
       </p:cxnSp>
       <p:pic>
         <p:nvPicPr>
-          <p:cNvPr id="53" name="그림 10" descr="C:/Users/Admin1/AppData/Roaming/PolarisOffice/ETemp/29812_9101400/fImage15299906334.png"/>
+          <p:cNvPr id="53" name="그림 10"/>
           <p:cNvPicPr>
             <a:picLocks noChangeAspect="1"/>
           </p:cNvPicPr>
@@ -8500,7 +8862,7 @@
 </file>
 
 <file path=ppt/slides/slide5.xml><?xml version="1.0" encoding="utf-8"?>
-<p:sld xmlns:a="http://schemas.openxmlformats.org/drawingml/2006/main" xmlns:r="http://schemas.openxmlformats.org/officeDocument/2006/relationships" xmlns:p="http://schemas.openxmlformats.org/presentationml/2006/main">
+<p:sld xmlns:a="http://schemas.openxmlformats.org/drawingml/2006/main" xmlns:r="http://schemas.openxmlformats.org/officeDocument/2006/relationships" xmlns:p="http://schemas.openxmlformats.org/presentationml/2006/main" xmlns:p14="http://schemas.microsoft.com/office/powerpoint/2010/main">
   <p:cSld>
     <p:spTree>
       <p:nvGrpSpPr>
@@ -8981,7 +9343,7 @@
       </p:sp>
       <p:pic>
         <p:nvPicPr>
-          <p:cNvPr id="55" name="그림 1" descr="C:/Users/Admin1/AppData/Roaming/PolarisOffice/ETemp/29716_8262256/fImage725117241.png"/>
+          <p:cNvPr id="55" name="그림 1"/>
           <p:cNvPicPr>
             <a:picLocks noChangeAspect="1"/>
           </p:cNvPicPr>
@@ -9012,7 +9374,7 @@
       </p:pic>
       <p:pic>
         <p:nvPicPr>
-          <p:cNvPr id="56" name="그림 4" descr="C:/Users/Admin1/AppData/Roaming/PolarisOffice/ETemp/29716_8262256/fImage75571738467.png"/>
+          <p:cNvPr id="56" name="그림 4"/>
           <p:cNvPicPr>
             <a:picLocks noChangeAspect="1"/>
           </p:cNvPicPr>
@@ -9043,7 +9405,7 @@
       </p:pic>
       <p:pic>
         <p:nvPicPr>
-          <p:cNvPr id="57" name="그림 11" descr="C:/Users/Admin1/AppData/Roaming/PolarisOffice/ETemp/29716_8262256/fImage2242171946962.png"/>
+          <p:cNvPr id="57" name="그림 11"/>
           <p:cNvPicPr>
             <a:picLocks noChangeAspect="1"/>
           </p:cNvPicPr>
@@ -9209,7 +9571,7 @@
       </p:sp>
       <p:pic>
         <p:nvPicPr>
-          <p:cNvPr id="59" name="그림 13" descr="C:/Users/Admin1/AppData/Roaming/PolarisOffice/ETemp/29716_8262256/fImage78881816334.png"/>
+          <p:cNvPr id="59" name="그림 13"/>
           <p:cNvPicPr>
             <a:picLocks noChangeAspect="1"/>
           </p:cNvPicPr>
@@ -9240,7 +9602,7 @@
       </p:pic>
       <p:pic>
         <p:nvPicPr>
-          <p:cNvPr id="60" name="그림 16" descr="C:/Users/Admin1/AppData/Roaming/PolarisOffice/ETemp/29716_8262256/fImage84131826500.png"/>
+          <p:cNvPr id="60" name="그림 16"/>
           <p:cNvPicPr>
             <a:picLocks noChangeAspect="1"/>
           </p:cNvPicPr>
@@ -9271,7 +9633,7 @@
       </p:pic>
       <p:pic>
         <p:nvPicPr>
-          <p:cNvPr id="61" name="그림 20" descr="C:/Users/Admin1/AppData/Roaming/PolarisOffice/ETemp/29716_8262256/fImage2242171946962.png"/>
+          <p:cNvPr id="61" name="그림 20"/>
           <p:cNvPicPr>
             <a:picLocks noChangeAspect="1"/>
           </p:cNvPicPr>
@@ -9300,17 +9662,17 @@
       </p:pic>
       <p:pic>
         <p:nvPicPr>
-          <p:cNvPr id="62" name="그림 21" descr="C:/Users/Admin1/AppData/Roaming/PolarisOffice/ETemp/29716_8262256/fImage149321859169.png"/>
+          <p:cNvPr id="62" name="그림 21" descr="C:/Users/Admin1/AppData/Roaming/PolarisOffice/ETemp/34236_8196696/fImage149321859169.png"/>
           <p:cNvPicPr>
             <a:picLocks noChangeAspect="1"/>
           </p:cNvPicPr>
           <p:nvPr/>
         </p:nvPicPr>
         <p:blipFill rotWithShape="1">
-          <a:blip r:embed="rId7" cstate="print">
+          <a:blip r:embed="rId7" cstate="hqprint">
             <a:extLst>
               <a:ext uri="{28A0092B-C50C-407E-A947-70E740481C1C}">
-                <a14:useLocalDpi xmlns:a14="http://schemas.microsoft.com/office/drawing/2010/main" val="0"/>
+                <a14:useLocalDpi xmlns:a14="http://schemas.microsoft.com/office/drawing/2010/main"/>
               </a:ext>
             </a:extLst>
           </a:blip>
@@ -9321,7 +9683,7 @@
         <p:spPr>
           <a:xfrm rot="0">
             <a:off x="8191500" y="1447165"/>
-            <a:ext cx="2773045" cy="1111885"/>
+            <a:ext cx="2773680" cy="1137285"/>
           </a:xfrm>
           <a:prstGeom prst="roundRect"/>
           <a:solidFill>
@@ -9331,17 +9693,17 @@
       </p:pic>
       <p:pic>
         <p:nvPicPr>
-          <p:cNvPr id="63" name="그림 24" descr="C:/Users/Admin1/AppData/Roaming/PolarisOffice/ETemp/29716_8262256/fImage83981865724.png"/>
+          <p:cNvPr id="63" name="그림 24" descr="C:/Users/Admin1/AppData/Roaming/PolarisOffice/ETemp/34236_8196696/fImage83981865724.png"/>
           <p:cNvPicPr>
             <a:picLocks noChangeAspect="1"/>
           </p:cNvPicPr>
           <p:nvPr/>
         </p:nvPicPr>
         <p:blipFill rotWithShape="1">
-          <a:blip r:embed="rId8" cstate="print">
+          <a:blip r:embed="rId8" cstate="hqprint">
             <a:extLst>
               <a:ext uri="{28A0092B-C50C-407E-A947-70E740481C1C}">
-                <a14:useLocalDpi xmlns:a14="http://schemas.microsoft.com/office/drawing/2010/main" val="0"/>
+                <a14:useLocalDpi xmlns:a14="http://schemas.microsoft.com/office/drawing/2010/main"/>
               </a:ext>
             </a:extLst>
           </a:blip>
@@ -9352,7 +9714,7 @@
         <p:spPr>
           <a:xfrm rot="0">
             <a:off x="6819900" y="1436370"/>
-            <a:ext cx="1243330" cy="1130935"/>
+            <a:ext cx="1243965" cy="1156335"/>
           </a:xfrm>
           <a:prstGeom prst="roundRect"/>
           <a:solidFill>
@@ -9395,7 +9757,7 @@
       </p:cxnSp>
       <p:pic>
         <p:nvPicPr>
-          <p:cNvPr id="65" name="그림 28" descr="C:/Users/Admin1/AppData/Roaming/PolarisOffice/ETemp/29716_8262256/fImage48931881478.png"/>
+          <p:cNvPr id="65" name="그림 28"/>
           <p:cNvPicPr>
             <a:picLocks noChangeAspect="1"/>
           </p:cNvPicPr>
@@ -9448,7 +9810,7 @@
 </file>
 
 <file path=ppt/slides/slide6.xml><?xml version="1.0" encoding="utf-8"?>
-<p:sld xmlns:a="http://schemas.openxmlformats.org/drawingml/2006/main" xmlns:r="http://schemas.openxmlformats.org/officeDocument/2006/relationships" xmlns:p="http://schemas.openxmlformats.org/presentationml/2006/main" xmlns:p14="http://schemas.microsoft.com/office/powerpoint/2010/main">
+<p:sld xmlns:a="http://schemas.openxmlformats.org/drawingml/2006/main" xmlns:r="http://schemas.openxmlformats.org/officeDocument/2006/relationships" xmlns:p="http://schemas.openxmlformats.org/presentationml/2006/main">
   <p:cSld>
     <p:spTree>
       <p:nvGrpSpPr>
@@ -9474,8 +9836,8 @@
         </p:nvSpPr>
         <p:spPr>
           <a:xfrm rot="0">
-            <a:off x="4333240" y="393700"/>
-            <a:ext cx="3529965" cy="554990"/>
+            <a:off x="4236085" y="419735"/>
+            <a:ext cx="3716655" cy="478155"/>
           </a:xfrm>
           <a:prstGeom prst="rect"/>
           <a:noFill/>
@@ -9490,44 +9852,364 @@
           </a:bodyPr>
           <a:lstStyle/>
           <a:p>
-            <a:pPr marL="0" indent="0" rtl="0" algn="l" defTabSz="914400" eaLnBrk="1" latinLnBrk="0" hangingPunct="1">
-              <a:buFontTx/>
-              <a:buNone/>
-            </a:pPr>
-            <a:r>
-              <a:rPr lang="ko-KR" sz="3000" b="1">
+            <a:pPr marL="0" indent="0" rtl="0" algn="ctr" defTabSz="914400" eaLnBrk="1" latinLnBrk="0" hangingPunct="1">
+              <a:buFontTx/>
+              <a:buNone/>
+            </a:pPr>
+            <a:r>
+              <a:rPr lang="ko-KR" sz="2500" b="1">
                 <a:solidFill>
                   <a:schemeClr val="tx1"/>
                 </a:solidFill>
-                <a:latin typeface="맑은 고딕" charset="0"/>
-                <a:ea typeface="맑은 고딕" charset="0"/>
-              </a:rPr>
-              <a:t>열</a:t>
-            </a:r>
-            <a:r>
-              <a:rPr lang="ko-KR" sz="3000" b="1">
+                <a:latin typeface="나눔바른고딕" charset="0"/>
+                <a:ea typeface="나눔바른고딕" charset="0"/>
+              </a:rPr>
+              <a:t>여섯</a:t>
+            </a:r>
+            <a:r>
+              <a:rPr lang="ko-KR" sz="2500" b="1">
                 <a:solidFill>
                   <a:schemeClr val="tx1"/>
                 </a:solidFill>
-                <a:latin typeface="맑은 고딕" charset="0"/>
-                <a:ea typeface="맑은 고딕" charset="0"/>
-              </a:rPr>
-              <a:t>두</a:t>
-            </a:r>
-            <a:r>
-              <a:rPr lang="ko-KR" sz="3000" b="1">
-                <a:solidFill>
-                  <a:schemeClr val="tx1"/>
-                </a:solidFill>
-                <a:latin typeface="맑은 고딕" charset="0"/>
-                <a:ea typeface="맑은 고딕" charset="0"/>
+                <a:latin typeface="나눔바른고딕" charset="0"/>
+                <a:ea typeface="나눔바른고딕" charset="0"/>
               </a:rPr>
               <a:t> 번째 튜토리얼</a:t>
             </a:r>
-            <a:endParaRPr lang="ko-KR" altLang="en-US" sz="3000" b="1">
+            <a:endParaRPr lang="ko-KR" altLang="en-US" sz="2500" b="1">
               <a:solidFill>
                 <a:schemeClr val="tx1"/>
               </a:solidFill>
+              <a:latin typeface="나눔바른고딕" charset="0"/>
+              <a:ea typeface="나눔바른고딕" charset="0"/>
+            </a:endParaRPr>
+          </a:p>
+        </p:txBody>
+      </p:sp>
+      <p:sp>
+        <p:nvSpPr>
+          <p:cNvPr id="29" name="Rect 0"/>
+          <p:cNvSpPr txBox="1">
+            <a:spLocks/>
+          </p:cNvSpPr>
+          <p:nvPr/>
+        </p:nvSpPr>
+        <p:spPr>
+          <a:xfrm rot="0">
+            <a:off x="6830695" y="3605530"/>
+            <a:ext cx="4135120" cy="677545"/>
+          </a:xfrm>
+          <a:prstGeom prst="rect"/>
+          <a:noFill/>
+          <a:ln w="0">
+            <a:noFill/>
+            <a:prstDash/>
+          </a:ln>
+        </p:spPr>
+        <p:txBody>
+          <a:bodyPr wrap="square" lIns="89535" tIns="46355" rIns="89535" bIns="46355" numCol="1" vert="horz" anchor="t">
+            <a:spAutoFit/>
+          </a:bodyPr>
+          <a:lstStyle/>
+          <a:p>
+            <a:pPr marL="0" indent="0" rtl="0" algn="l" defTabSz="914400" eaLnBrk="1" latinLnBrk="0" hangingPunct="1">
+              <a:buFontTx/>
+              <a:buNone/>
+            </a:pPr>
+            <a:r>
+              <a:rPr lang="ko-KR" sz="2000" b="1">
+                <a:solidFill>
+                  <a:srgbClr val="0611F2"/>
+                </a:solidFill>
+                <a:latin typeface="맑은 고딕" charset="0"/>
+                <a:ea typeface="맑은 고딕" charset="0"/>
+              </a:rPr>
+              <a:t>19</a:t>
+            </a:r>
+            <a:r>
+              <a:rPr sz="2000" b="1">
+                <a:solidFill>
+                  <a:srgbClr val="0611F2"/>
+                </a:solidFill>
+                <a:latin typeface="맑은 고딕" charset="0"/>
+                <a:ea typeface="맑은 고딕" charset="0"/>
+              </a:rPr>
+              <a:t>.</a:t>
+            </a:r>
+            <a:r>
+              <a:rPr lang="ko-KR" sz="2000" b="1">
+                <a:solidFill>
+                  <a:srgbClr val="0611F2"/>
+                </a:solidFill>
+                <a:latin typeface="맑은 고딕" charset="0"/>
+                <a:ea typeface="맑은 고딕" charset="0"/>
+              </a:rPr>
+              <a:t> </a:t>
+            </a:r>
+            <a:r>
+              <a:rPr lang="ko-KR" sz="1800">
+                <a:latin typeface="맑은 고딕" charset="0"/>
+                <a:ea typeface="맑은 고딕" charset="0"/>
+              </a:rPr>
+              <a:t>이제 Tags &amp; Layes에서 태그를 </a:t>
+            </a:r>
+            <a:r>
+              <a:rPr lang="ko-KR" sz="1800">
+                <a:latin typeface="맑은 고딕" charset="0"/>
+                <a:ea typeface="맑은 고딕" charset="0"/>
+              </a:rPr>
+              <a:t>추가하기</a:t>
+            </a:r>
+            <a:r>
+              <a:rPr lang="ko-KR" sz="1800">
+                <a:latin typeface="맑은 고딕" charset="0"/>
+                <a:ea typeface="맑은 고딕" charset="0"/>
+              </a:rPr>
+              <a:t> </a:t>
+            </a:r>
+            <a:r>
+              <a:rPr lang="ko-KR" sz="1800">
+                <a:latin typeface="맑은 고딕" charset="0"/>
+                <a:ea typeface="맑은 고딕" charset="0"/>
+              </a:rPr>
+              <a:t>위해 등록을 선택합니다.</a:t>
+            </a:r>
+            <a:endParaRPr lang="ko-KR" altLang="en-US" sz="1800">
+              <a:latin typeface="맑은 고딕" charset="0"/>
+              <a:ea typeface="맑은 고딕" charset="0"/>
+            </a:endParaRPr>
+          </a:p>
+        </p:txBody>
+      </p:sp>
+      <p:sp>
+        <p:nvSpPr>
+          <p:cNvPr id="48" name="Rect 0"/>
+          <p:cNvSpPr txBox="1">
+            <a:spLocks/>
+          </p:cNvSpPr>
+          <p:nvPr/>
+        </p:nvSpPr>
+        <p:spPr>
+          <a:xfrm rot="0">
+            <a:off x="1234440" y="5187315"/>
+            <a:ext cx="4131310" cy="954405"/>
+          </a:xfrm>
+          <a:prstGeom prst="rect"/>
+          <a:noFill/>
+          <a:ln w="0">
+            <a:noFill/>
+            <a:prstDash/>
+          </a:ln>
+        </p:spPr>
+        <p:txBody>
+          <a:bodyPr wrap="square" lIns="89535" tIns="46355" rIns="89535" bIns="46355" numCol="1" vert="horz" anchor="t">
+            <a:spAutoFit/>
+          </a:bodyPr>
+          <a:lstStyle/>
+          <a:p>
+            <a:pPr marL="0" indent="0" rtl="0" algn="l" defTabSz="914400" eaLnBrk="1" latinLnBrk="0" hangingPunct="1">
+              <a:buFontTx/>
+              <a:buNone/>
+            </a:pPr>
+            <a:r>
+              <a:rPr lang="ko-KR" sz="2000" b="1">
+                <a:solidFill>
+                  <a:srgbClr val="0611F2"/>
+                </a:solidFill>
+                <a:latin typeface="맑은 고딕" charset="0"/>
+                <a:ea typeface="맑은 고딕" charset="0"/>
+              </a:rPr>
+              <a:t>18</a:t>
+            </a:r>
+            <a:r>
+              <a:rPr sz="2000" b="1">
+                <a:solidFill>
+                  <a:srgbClr val="0611F2"/>
+                </a:solidFill>
+                <a:latin typeface="맑은 고딕" charset="0"/>
+                <a:ea typeface="맑은 고딕" charset="0"/>
+              </a:rPr>
+              <a:t>.</a:t>
+            </a:r>
+            <a:r>
+              <a:rPr lang="ko-KR" sz="2000" b="1">
+                <a:solidFill>
+                  <a:srgbClr val="0611F2"/>
+                </a:solidFill>
+                <a:latin typeface="맑은 고딕" charset="0"/>
+                <a:ea typeface="맑은 고딕" charset="0"/>
+              </a:rPr>
+              <a:t> </a:t>
+            </a:r>
+            <a:r>
+              <a:rPr lang="ko-KR" sz="1800">
+                <a:latin typeface="맑은 고딕" charset="0"/>
+                <a:ea typeface="맑은 고딕" charset="0"/>
+              </a:rPr>
+              <a:t>그러고 나서 Billiard Ball (One) </a:t>
+            </a:r>
+            <a:r>
+              <a:rPr lang="ko-KR" sz="1800">
+                <a:latin typeface="맑은 고딕" charset="0"/>
+                <a:ea typeface="맑은 고딕" charset="0"/>
+              </a:rPr>
+              <a:t>오브젝트를</a:t>
+            </a:r>
+            <a:r>
+              <a:rPr lang="ko-KR" sz="1800">
+                <a:latin typeface="맑은 고딕" charset="0"/>
+                <a:ea typeface="맑은 고딕" charset="0"/>
+              </a:rPr>
+              <a:t> </a:t>
+            </a:r>
+            <a:r>
+              <a:rPr lang="ko-KR" sz="1800">
+                <a:latin typeface="맑은 고딕" charset="0"/>
+                <a:ea typeface="맑은 고딕" charset="0"/>
+              </a:rPr>
+              <a:t>선택하고 Add Tag...를 </a:t>
+            </a:r>
+            <a:r>
+              <a:rPr lang="ko-KR" sz="1800">
+                <a:latin typeface="맑은 고딕" charset="0"/>
+                <a:ea typeface="맑은 고딕" charset="0"/>
+              </a:rPr>
+              <a:t>선택합니</a:t>
+            </a:r>
+            <a:r>
+              <a:rPr lang="ko-KR" sz="1800">
+                <a:latin typeface="맑은 고딕" charset="0"/>
+                <a:ea typeface="맑은 고딕" charset="0"/>
+              </a:rPr>
+              <a:t>다.</a:t>
+            </a:r>
+            <a:endParaRPr lang="ko-KR" altLang="en-US" sz="1800">
+              <a:latin typeface="맑은 고딕" charset="0"/>
+              <a:ea typeface="맑은 고딕" charset="0"/>
+            </a:endParaRPr>
+          </a:p>
+        </p:txBody>
+      </p:sp>
+      <p:sp>
+        <p:nvSpPr>
+          <p:cNvPr id="54" name="Rect 0"/>
+          <p:cNvSpPr txBox="1">
+            <a:spLocks/>
+          </p:cNvSpPr>
+          <p:nvPr/>
+        </p:nvSpPr>
+        <p:spPr>
+          <a:xfrm rot="0">
+            <a:off x="6827520" y="5474335"/>
+            <a:ext cx="4138295" cy="677545"/>
+          </a:xfrm>
+          <a:prstGeom prst="rect"/>
+          <a:noFill/>
+          <a:ln w="0">
+            <a:noFill/>
+            <a:prstDash/>
+          </a:ln>
+        </p:spPr>
+        <p:txBody>
+          <a:bodyPr wrap="square" lIns="89535" tIns="46355" rIns="89535" bIns="46355" numCol="1" vert="horz" anchor="t">
+            <a:spAutoFit/>
+          </a:bodyPr>
+          <a:lstStyle/>
+          <a:p>
+            <a:pPr marL="0" indent="0" rtl="0" algn="l" defTabSz="914400" eaLnBrk="1" latinLnBrk="0" hangingPunct="1">
+              <a:buFontTx/>
+              <a:buNone/>
+            </a:pPr>
+            <a:r>
+              <a:rPr lang="ko-KR" sz="2000" b="1">
+                <a:solidFill>
+                  <a:srgbClr val="0611F2"/>
+                </a:solidFill>
+                <a:latin typeface="맑은 고딕" charset="0"/>
+                <a:ea typeface="맑은 고딕" charset="0"/>
+              </a:rPr>
+              <a:t>2</a:t>
+            </a:r>
+            <a:r>
+              <a:rPr lang="ko-KR" sz="2000" b="1">
+                <a:solidFill>
+                  <a:srgbClr val="0611F2"/>
+                </a:solidFill>
+                <a:latin typeface="맑은 고딕" charset="0"/>
+                <a:ea typeface="맑은 고딕" charset="0"/>
+              </a:rPr>
+              <a:t>0</a:t>
+            </a:r>
+            <a:r>
+              <a:rPr sz="2000" b="1">
+                <a:solidFill>
+                  <a:srgbClr val="0611F2"/>
+                </a:solidFill>
+                <a:latin typeface="맑은 고딕" charset="0"/>
+                <a:ea typeface="맑은 고딕" charset="0"/>
+              </a:rPr>
+              <a:t>.</a:t>
+            </a:r>
+            <a:r>
+              <a:rPr lang="ko-KR" sz="2000" b="1">
+                <a:solidFill>
+                  <a:srgbClr val="0611F2"/>
+                </a:solidFill>
+                <a:latin typeface="맑은 고딕" charset="0"/>
+                <a:ea typeface="맑은 고딕" charset="0"/>
+              </a:rPr>
+              <a:t> </a:t>
+            </a:r>
+            <a:r>
+              <a:rPr lang="ko-KR" sz="1800">
+                <a:latin typeface="맑은 고딕" charset="0"/>
+                <a:ea typeface="맑은 고딕" charset="0"/>
+              </a:rPr>
+              <a:t>그리고 Pillar라는 이름으로 </a:t>
+            </a:r>
+            <a:r>
+              <a:rPr lang="ko-KR" sz="1800">
+                <a:latin typeface="맑은 고딕" charset="0"/>
+                <a:ea typeface="맑은 고딕" charset="0"/>
+              </a:rPr>
+              <a:t>설정한</a:t>
+            </a:r>
+            <a:r>
+              <a:rPr lang="ko-KR" sz="1800">
+                <a:latin typeface="맑은 고딕" charset="0"/>
+                <a:ea typeface="맑은 고딕" charset="0"/>
+              </a:rPr>
+              <a:t> </a:t>
+            </a:r>
+            <a:r>
+              <a:rPr lang="ko-KR" sz="1800">
+                <a:latin typeface="맑은 고딕" charset="0"/>
+                <a:ea typeface="맑은 고딕" charset="0"/>
+              </a:rPr>
+              <a:t>다음</a:t>
+            </a:r>
+            <a:r>
+              <a:rPr lang="ko-KR" sz="1800">
+                <a:latin typeface="맑은 고딕" charset="0"/>
+                <a:ea typeface="맑은 고딕" charset="0"/>
+              </a:rPr>
+              <a:t> </a:t>
+            </a:r>
+            <a:r>
+              <a:rPr lang="ko-KR" sz="1800">
+                <a:latin typeface="맑은 고딕" charset="0"/>
+                <a:ea typeface="맑은 고딕" charset="0"/>
+              </a:rPr>
+              <a:t>저장합니다.</a:t>
+            </a:r>
+            <a:r>
+              <a:rPr lang="ko-KR" sz="1800">
+                <a:latin typeface="맑은 고딕" charset="0"/>
+                <a:ea typeface="맑은 고딕" charset="0"/>
+              </a:rPr>
+              <a:t> </a:t>
+            </a:r>
+            <a:endParaRPr lang="ko-KR" altLang="en-US" sz="1800">
               <a:latin typeface="맑은 고딕" charset="0"/>
               <a:ea typeface="맑은 고딕" charset="0"/>
             </a:endParaRPr>
@@ -9536,7 +10218,69 @@
       </p:sp>
       <p:pic>
         <p:nvPicPr>
-          <p:cNvPr id="61" name="그림 24"/>
+          <p:cNvPr id="66" name="그림 1" descr="C:/Users/Admin1/AppData/Roaming/PolarisOffice/ETemp/34236_8196696/fImage418318441.png"/>
+          <p:cNvPicPr>
+            <a:picLocks noChangeAspect="1"/>
+          </p:cNvPicPr>
+          <p:nvPr/>
+        </p:nvPicPr>
+        <p:blipFill rotWithShape="1">
+          <a:blip r:embed="rId2" cstate="print">
+            <a:extLst>
+              <a:ext uri="{28A0092B-C50C-407E-A947-70E740481C1C}">
+                <a14:useLocalDpi xmlns:a14="http://schemas.microsoft.com/office/drawing/2010/main" val="0"/>
+              </a:ext>
+            </a:extLst>
+          </a:blip>
+          <a:stretch>
+            <a:fillRect/>
+          </a:stretch>
+        </p:blipFill>
+        <p:spPr>
+          <a:xfrm rot="0">
+            <a:off x="1240790" y="1447165"/>
+            <a:ext cx="2550160" cy="3566795"/>
+          </a:xfrm>
+          <a:prstGeom prst="roundRect"/>
+          <a:solidFill>
+            <a:srgbClr val="EDEDED"/>
+          </a:solidFill>
+        </p:spPr>
+      </p:pic>
+      <p:pic>
+        <p:nvPicPr>
+          <p:cNvPr id="67" name="그림 4" descr="C:/Users/Admin1/AppData/Roaming/PolarisOffice/ETemp/34236_8196696/fImage73861858467.png"/>
+          <p:cNvPicPr>
+            <a:picLocks noChangeAspect="1"/>
+          </p:cNvPicPr>
+          <p:nvPr/>
+        </p:nvPicPr>
+        <p:blipFill rotWithShape="1">
+          <a:blip r:embed="rId3" cstate="print">
+            <a:extLst>
+              <a:ext uri="{28A0092B-C50C-407E-A947-70E740481C1C}">
+                <a14:useLocalDpi xmlns:a14="http://schemas.microsoft.com/office/drawing/2010/main" val="0"/>
+              </a:ext>
+            </a:extLst>
+          </a:blip>
+          <a:stretch>
+            <a:fillRect/>
+          </a:stretch>
+        </p:blipFill>
+        <p:spPr>
+          <a:xfrm rot="0">
+            <a:off x="3919220" y="2110105"/>
+            <a:ext cx="1447800" cy="2232025"/>
+          </a:xfrm>
+          <a:prstGeom prst="roundRect"/>
+          <a:solidFill>
+            <a:srgbClr val="EDEDED"/>
+          </a:solidFill>
+        </p:spPr>
+      </p:pic>
+      <p:pic>
+        <p:nvPicPr>
+          <p:cNvPr id="69" name="그림 10" descr="C:/Users/Admin1/AppData/Roaming/PolarisOffice/ETemp/34236_8196696/fImage28991876334.png"/>
           <p:cNvPicPr>
             <a:picLocks noChangeAspect="1"/>
           </p:cNvPicPr>
@@ -9556,8 +10300,8 @@
         </p:blipFill>
         <p:spPr>
           <a:xfrm rot="0">
-            <a:off x="7040245" y="1402715"/>
-            <a:ext cx="3983355" cy="1395095"/>
+            <a:off x="6836410" y="4410075"/>
+            <a:ext cx="4130040" cy="982345"/>
           </a:xfrm>
           <a:prstGeom prst="roundRect"/>
           <a:solidFill>
@@ -9567,7 +10311,7 @@
       </p:pic>
       <p:pic>
         <p:nvPicPr>
-          <p:cNvPr id="62" name="그림 27"/>
+          <p:cNvPr id="70" name="그림 13" descr="C:/Users/Admin1/AppData/Roaming/PolarisOffice/ETemp/34236_8196696/fImage87761886500.png"/>
           <p:cNvPicPr>
             <a:picLocks noChangeAspect="1"/>
           </p:cNvPicPr>
@@ -9587,8 +10331,8 @@
         </p:blipFill>
         <p:spPr>
           <a:xfrm rot="0">
-            <a:off x="7039610" y="2927350"/>
-            <a:ext cx="3992880" cy="1056005"/>
+            <a:off x="6830695" y="1447165"/>
+            <a:ext cx="4126865" cy="2059305"/>
           </a:xfrm>
           <a:prstGeom prst="roundRect"/>
           <a:solidFill>
@@ -9596,18 +10340,58 @@
           </a:solidFill>
         </p:spPr>
       </p:pic>
+    </p:spTree>
+  </p:cSld>
+  <p:clrMapOvr>
+    <a:masterClrMapping/>
+  </p:clrMapOvr>
+  <mc:AlternateContent xmlns:mc="http://schemas.openxmlformats.org/markup-compatibility/2006">
+    <mc:Choice xmlns:p14="http://schemas.microsoft.com/office/powerpoint/2010/main" Requires="p14">
+      <p:transition spd="slow" p14:dur="1000"/>
+    </mc:Choice>
+    <mc:Fallback>
+      <p:transition spd="slow"/>
+    </mc:Fallback>
+  </mc:AlternateContent>
+  <p:timing>
+    <p:tnLst>
+      <p:par>
+        <p:cTn id="1" dur="indefinite" restart="never" nodeType="tmRoot"/>
+      </p:par>
+    </p:tnLst>
+  </p:timing>
+</p:sld>
+</file>
+
+<file path=ppt/slides/slide7.xml><?xml version="1.0" encoding="utf-8"?>
+<p:sld xmlns:a="http://schemas.openxmlformats.org/drawingml/2006/main" xmlns:r="http://schemas.openxmlformats.org/officeDocument/2006/relationships" xmlns:p="http://schemas.openxmlformats.org/presentationml/2006/main">
+  <p:cSld>
+    <p:spTree>
+      <p:nvGrpSpPr>
+        <p:cNvPr id="1" name=""/>
+        <p:cNvGrpSpPr/>
+        <p:nvPr/>
+      </p:nvGrpSpPr>
+      <p:grpSpPr>
+        <a:xfrm>
+          <a:off x="0" y="0"/>
+          <a:ext cx="0" cy="0"/>
+          <a:chOff x="0" y="0"/>
+          <a:chExt cx="0" cy="0"/>
+        </a:xfrm>
+      </p:grpSpPr>
       <p:sp>
         <p:nvSpPr>
-          <p:cNvPr id="63" name="텍스트 상자 30"/>
+          <p:cNvPr id="2" name="Rect 0"/>
           <p:cNvSpPr txBox="1">
             <a:spLocks/>
           </p:cNvSpPr>
           <p:nvPr/>
         </p:nvSpPr>
         <p:spPr>
-          <a:xfrm>
-            <a:off x="7052945" y="4088765"/>
-            <a:ext cx="3971925" cy="2061845"/>
+          <a:xfrm rot="0">
+            <a:off x="4236085" y="419735"/>
+            <a:ext cx="3716655" cy="478155"/>
           </a:xfrm>
           <a:prstGeom prst="rect"/>
           <a:noFill/>
@@ -9622,6 +10406,66 @@
           </a:bodyPr>
           <a:lstStyle/>
           <a:p>
+            <a:pPr marL="0" indent="0" rtl="0" algn="ctr" defTabSz="914400" eaLnBrk="1" latinLnBrk="0" hangingPunct="1">
+              <a:buFontTx/>
+              <a:buNone/>
+            </a:pPr>
+            <a:r>
+              <a:rPr lang="ko-KR" sz="2500" b="1">
+                <a:solidFill>
+                  <a:schemeClr val="tx1"/>
+                </a:solidFill>
+                <a:latin typeface="나눔바른고딕" charset="0"/>
+                <a:ea typeface="나눔바른고딕" charset="0"/>
+              </a:rPr>
+              <a:t>일곱</a:t>
+            </a:r>
+            <a:r>
+              <a:rPr lang="ko-KR" sz="2500" b="1">
+                <a:solidFill>
+                  <a:schemeClr val="tx1"/>
+                </a:solidFill>
+                <a:latin typeface="나눔바른고딕" charset="0"/>
+                <a:ea typeface="나눔바른고딕" charset="0"/>
+              </a:rPr>
+              <a:t> 번째 튜토리얼</a:t>
+            </a:r>
+            <a:endParaRPr lang="ko-KR" altLang="en-US" sz="2500" b="1">
+              <a:solidFill>
+                <a:schemeClr val="tx1"/>
+              </a:solidFill>
+              <a:latin typeface="나눔바른고딕" charset="0"/>
+              <a:ea typeface="나눔바른고딕" charset="0"/>
+            </a:endParaRPr>
+          </a:p>
+        </p:txBody>
+      </p:sp>
+      <p:sp>
+        <p:nvSpPr>
+          <p:cNvPr id="48" name="Rect 0"/>
+          <p:cNvSpPr txBox="1">
+            <a:spLocks/>
+          </p:cNvSpPr>
+          <p:nvPr/>
+        </p:nvSpPr>
+        <p:spPr>
+          <a:xfrm rot="0">
+            <a:off x="1240155" y="5480050"/>
+            <a:ext cx="4142740" cy="677545"/>
+          </a:xfrm>
+          <a:prstGeom prst="rect"/>
+          <a:noFill/>
+          <a:ln w="0">
+            <a:noFill/>
+            <a:prstDash/>
+          </a:ln>
+        </p:spPr>
+        <p:txBody>
+          <a:bodyPr wrap="square" lIns="89535" tIns="46355" rIns="89535" bIns="46355" numCol="1" vert="horz" anchor="t">
+            <a:spAutoFit/>
+          </a:bodyPr>
+          <a:lstStyle/>
+          <a:p>
             <a:pPr marL="0" indent="0" rtl="0" algn="l" defTabSz="914400" eaLnBrk="1" latinLnBrk="0" hangingPunct="1">
               <a:buFontTx/>
               <a:buNone/>
@@ -9634,7 +10478,17 @@
                 <a:latin typeface="맑은 고딕" charset="0"/>
                 <a:ea typeface="맑은 고딕" charset="0"/>
               </a:rPr>
-              <a:t>30</a:t>
+              <a:t>2</a:t>
+            </a:r>
+            <a:r>
+              <a:rPr lang="ko-KR" sz="2000" b="1">
+                <a:solidFill>
+                  <a:srgbClr val="0611F2"/>
+                </a:solidFill>
+                <a:latin typeface="맑은 고딕" charset="0"/>
+                <a:ea typeface="맑은 고딕" charset="0"/>
+              </a:rPr>
+              <a:t>2</a:t>
             </a:r>
             <a:r>
               <a:rPr sz="2000" b="1">
@@ -9644,41 +10498,304 @@
                 <a:latin typeface="맑은 고딕" charset="0"/>
                 <a:ea typeface="맑은 고딕" charset="0"/>
               </a:rPr>
-              <a:t>. </a:t>
-            </a:r>
-            <a:r>
-              <a:rPr lang="ko-KR" sz="1800">
-                <a:latin typeface="맑은 고딕" charset="0"/>
-                <a:ea typeface="맑은 고딕" charset="0"/>
-              </a:rPr>
-              <a:t>그다음 Project 폴더에 있는 Physic Material 파일에 Physic Material을 선택합니다.</a:t>
+              <a:t>.</a:t>
+            </a:r>
+            <a:r>
+              <a:rPr lang="ko-KR" sz="2000" b="1">
+                <a:solidFill>
+                  <a:srgbClr val="0611F2"/>
+                </a:solidFill>
+                <a:latin typeface="맑은 고딕" charset="0"/>
+                <a:ea typeface="맑은 고딕" charset="0"/>
+              </a:rPr>
+              <a:t> </a:t>
+            </a:r>
+            <a:r>
+              <a:rPr lang="ko-KR" sz="1800">
+                <a:latin typeface="맑은 고딕" charset="0"/>
+                <a:ea typeface="맑은 고딕" charset="0"/>
+              </a:rPr>
+              <a:t>그다음으로 Billiard Ball 이라는 </a:t>
+            </a:r>
+            <a:r>
+              <a:rPr lang="ko-KR" sz="1800">
+                <a:latin typeface="맑은 고딕" charset="0"/>
+                <a:ea typeface="맑은 고딕" charset="0"/>
+              </a:rPr>
+              <a:t>이름으로</a:t>
+            </a:r>
+            <a:r>
+              <a:rPr lang="ko-KR" sz="1800">
+                <a:latin typeface="맑은 고딕" charset="0"/>
+                <a:ea typeface="맑은 고딕" charset="0"/>
+              </a:rPr>
+              <a:t> </a:t>
+            </a:r>
+            <a:r>
+              <a:rPr lang="ko-KR" sz="1800">
+                <a:latin typeface="맑은 고딕" charset="0"/>
+                <a:ea typeface="맑은 고딕" charset="0"/>
+              </a:rPr>
+              <a:t>설정하고 저장합니다.</a:t>
             </a:r>
             <a:endParaRPr lang="ko-KR" altLang="en-US" sz="1800">
               <a:latin typeface="맑은 고딕" charset="0"/>
               <a:ea typeface="맑은 고딕" charset="0"/>
             </a:endParaRPr>
           </a:p>
+        </p:txBody>
+      </p:sp>
+      <p:sp>
+        <p:nvSpPr>
+          <p:cNvPr id="54" name="Rect 0"/>
+          <p:cNvSpPr txBox="1">
+            <a:spLocks/>
+          </p:cNvSpPr>
+          <p:nvPr/>
+        </p:nvSpPr>
+        <p:spPr>
+          <a:xfrm rot="0">
+            <a:off x="6827520" y="5474335"/>
+            <a:ext cx="4138295" cy="677545"/>
+          </a:xfrm>
+          <a:prstGeom prst="rect"/>
+          <a:noFill/>
+          <a:ln w="0">
+            <a:noFill/>
+            <a:prstDash/>
+          </a:ln>
+        </p:spPr>
+        <p:txBody>
+          <a:bodyPr wrap="square" lIns="89535" tIns="46355" rIns="89535" bIns="46355" numCol="1" vert="horz" anchor="t">
+            <a:spAutoFit/>
+          </a:bodyPr>
+          <a:lstStyle/>
           <a:p>
             <a:pPr marL="0" indent="0" rtl="0" algn="l" defTabSz="914400" eaLnBrk="1" latinLnBrk="0" hangingPunct="1">
               <a:buFontTx/>
               <a:buNone/>
             </a:pPr>
+            <a:r>
+              <a:rPr lang="ko-KR" sz="2000" b="1">
+                <a:solidFill>
+                  <a:srgbClr val="0611F2"/>
+                </a:solidFill>
+                <a:latin typeface="맑은 고딕" charset="0"/>
+                <a:ea typeface="맑은 고딕" charset="0"/>
+              </a:rPr>
+              <a:t>24</a:t>
+            </a:r>
+            <a:r>
+              <a:rPr sz="2000" b="1">
+                <a:solidFill>
+                  <a:srgbClr val="0611F2"/>
+                </a:solidFill>
+                <a:latin typeface="맑은 고딕" charset="0"/>
+                <a:ea typeface="맑은 고딕" charset="0"/>
+              </a:rPr>
+              <a:t>.</a:t>
+            </a:r>
+            <a:r>
+              <a:rPr lang="ko-KR" sz="2000" b="1">
+                <a:solidFill>
+                  <a:srgbClr val="0611F2"/>
+                </a:solidFill>
+                <a:latin typeface="맑은 고딕" charset="0"/>
+                <a:ea typeface="맑은 고딕" charset="0"/>
+              </a:rPr>
+              <a:t> </a:t>
+            </a:r>
+            <a:r>
+              <a:rPr lang="ko-KR" sz="1800">
+                <a:latin typeface="맑은 고딕" charset="0"/>
+                <a:ea typeface="맑은 고딕" charset="0"/>
+              </a:rPr>
+              <a:t>이제 Board 오브젝트의 위치와 </a:t>
+            </a:r>
+            <a:r>
+              <a:rPr lang="ko-KR" sz="1800">
+                <a:latin typeface="맑은 고딕" charset="0"/>
+                <a:ea typeface="맑은 고딕" charset="0"/>
+              </a:rPr>
+              <a:t>회전</a:t>
+            </a:r>
+            <a:r>
+              <a:rPr lang="ko-KR" sz="1800">
+                <a:latin typeface="맑은 고딕" charset="0"/>
+                <a:ea typeface="맑은 고딕" charset="0"/>
+              </a:rPr>
+              <a:t> </a:t>
+            </a:r>
+            <a:r>
+              <a:rPr lang="ko-KR" sz="1800">
+                <a:latin typeface="맑은 고딕" charset="0"/>
+                <a:ea typeface="맑은 고딕" charset="0"/>
+              </a:rPr>
+              <a:t>값을</a:t>
+            </a:r>
+            <a:r>
+              <a:rPr lang="ko-KR" sz="1800">
+                <a:latin typeface="맑은 고딕" charset="0"/>
+                <a:ea typeface="맑은 고딕" charset="0"/>
+              </a:rPr>
+              <a:t> </a:t>
+            </a:r>
+            <a:r>
+              <a:rPr lang="ko-KR" sz="1800">
+                <a:latin typeface="맑은 고딕" charset="0"/>
+                <a:ea typeface="맑은 고딕" charset="0"/>
+              </a:rPr>
+              <a:t>설정합니다.</a:t>
+            </a:r>
             <a:endParaRPr lang="ko-KR" altLang="en-US" sz="1800">
               <a:latin typeface="맑은 고딕" charset="0"/>
               <a:ea typeface="맑은 고딕" charset="0"/>
             </a:endParaRPr>
           </a:p>
+        </p:txBody>
+      </p:sp>
+      <p:pic>
+        <p:nvPicPr>
+          <p:cNvPr id="71" name="그림 16" descr="C:/Users/Admin1/AppData/Roaming/PolarisOffice/ETemp/34236_8196696/fImage93121979169.png"/>
+          <p:cNvPicPr>
+            <a:picLocks noChangeAspect="1"/>
+          </p:cNvPicPr>
+          <p:nvPr/>
+        </p:nvPicPr>
+        <p:blipFill rotWithShape="1">
+          <a:blip r:embed="rId2" cstate="print">
+            <a:extLst>
+              <a:ext uri="{28A0092B-C50C-407E-A947-70E740481C1C}">
+                <a14:useLocalDpi xmlns:a14="http://schemas.microsoft.com/office/drawing/2010/main" val="0"/>
+              </a:ext>
+            </a:extLst>
+          </a:blip>
+          <a:stretch>
+            <a:fillRect/>
+          </a:stretch>
+        </p:blipFill>
+        <p:spPr>
+          <a:xfrm rot="0">
+            <a:off x="1240790" y="1450975"/>
+            <a:ext cx="4135120" cy="1823085"/>
+          </a:xfrm>
+          <a:prstGeom prst="roundRect"/>
+          <a:solidFill>
+            <a:srgbClr val="EDEDED"/>
+          </a:solidFill>
+        </p:spPr>
+      </p:pic>
+      <p:sp>
+        <p:nvSpPr>
+          <p:cNvPr id="72" name="텍스트 상자 19"/>
+          <p:cNvSpPr txBox="1">
+            <a:spLocks/>
+          </p:cNvSpPr>
+          <p:nvPr/>
+        </p:nvSpPr>
+        <p:spPr>
+          <a:xfrm rot="0">
+            <a:off x="1234440" y="3384550"/>
+            <a:ext cx="4141470" cy="954405"/>
+          </a:xfrm>
+          <a:prstGeom prst="rect"/>
+          <a:noFill/>
+          <a:ln w="0">
+            <a:noFill/>
+            <a:prstDash/>
+          </a:ln>
+        </p:spPr>
+        <p:txBody>
+          <a:bodyPr wrap="square" lIns="89535" tIns="46355" rIns="89535" bIns="46355" numCol="1" vert="horz" anchor="t">
+            <a:spAutoFit/>
+          </a:bodyPr>
+          <a:lstStyle/>
           <a:p>
             <a:pPr marL="0" indent="0" rtl="0" algn="l" defTabSz="914400" eaLnBrk="1" latinLnBrk="0" hangingPunct="1">
               <a:buFontTx/>
               <a:buNone/>
             </a:pPr>
             <a:r>
-              <a:rPr lang="ko-KR" sz="1800">
-                <a:latin typeface="맑은 고딕" charset="0"/>
-                <a:ea typeface="맑은 고딕" charset="0"/>
-              </a:rPr>
-              <a:t>그런 다음 Billiard Ball 오브젝트에 있는 Sphere Collider 컴포넌트에 Physic Material을 넣어줍니다.</a:t>
+              <a:rPr lang="ko-KR" sz="2000" b="1">
+                <a:solidFill>
+                  <a:srgbClr val="0611F2"/>
+                </a:solidFill>
+                <a:latin typeface="맑은 고딕" charset="0"/>
+                <a:ea typeface="맑은 고딕" charset="0"/>
+              </a:rPr>
+              <a:t>2</a:t>
+            </a:r>
+            <a:r>
+              <a:rPr lang="ko-KR" sz="2000" b="1">
+                <a:solidFill>
+                  <a:srgbClr val="0611F2"/>
+                </a:solidFill>
+                <a:latin typeface="맑은 고딕" charset="0"/>
+                <a:ea typeface="맑은 고딕" charset="0"/>
+              </a:rPr>
+              <a:t>1</a:t>
+            </a:r>
+            <a:r>
+              <a:rPr sz="2000" b="1">
+                <a:solidFill>
+                  <a:srgbClr val="0611F2"/>
+                </a:solidFill>
+                <a:latin typeface="맑은 고딕" charset="0"/>
+                <a:ea typeface="맑은 고딕" charset="0"/>
+              </a:rPr>
+              <a:t>.</a:t>
+            </a:r>
+            <a:r>
+              <a:rPr lang="ko-KR" sz="2000" b="1">
+                <a:solidFill>
+                  <a:srgbClr val="0611F2"/>
+                </a:solidFill>
+                <a:latin typeface="맑은 고딕" charset="0"/>
+                <a:ea typeface="맑은 고딕" charset="0"/>
+              </a:rPr>
+              <a:t> </a:t>
+            </a:r>
+            <a:r>
+              <a:rPr lang="ko-KR" sz="1800">
+                <a:latin typeface="맑은 고딕" charset="0"/>
+                <a:ea typeface="맑은 고딕" charset="0"/>
+              </a:rPr>
+              <a:t>그런 다음 Tags &amp; Layes에서 </a:t>
+            </a:r>
+            <a:r>
+              <a:rPr lang="ko-KR" sz="1800">
+                <a:latin typeface="맑은 고딕" charset="0"/>
+                <a:ea typeface="맑은 고딕" charset="0"/>
+              </a:rPr>
+              <a:t>태그를</a:t>
+            </a:r>
+            <a:r>
+              <a:rPr lang="ko-KR" sz="1800">
+                <a:latin typeface="맑은 고딕" charset="0"/>
+                <a:ea typeface="맑은 고딕" charset="0"/>
+              </a:rPr>
+              <a:t> </a:t>
+            </a:r>
+            <a:r>
+              <a:rPr lang="ko-KR" sz="1800">
+                <a:latin typeface="맑은 고딕" charset="0"/>
+                <a:ea typeface="맑은 고딕" charset="0"/>
+              </a:rPr>
+              <a:t>추가하기 </a:t>
+            </a:r>
+            <a:r>
+              <a:rPr lang="ko-KR" sz="1800">
+                <a:latin typeface="맑은 고딕" charset="0"/>
+                <a:ea typeface="맑은 고딕" charset="0"/>
+              </a:rPr>
+              <a:t>위해 등록을 </a:t>
+            </a:r>
+            <a:r>
+              <a:rPr lang="ko-KR" sz="1800">
+                <a:latin typeface="맑은 고딕" charset="0"/>
+                <a:ea typeface="맑은 고딕" charset="0"/>
+              </a:rPr>
+              <a:t>선택합니다.</a:t>
             </a:r>
             <a:endParaRPr lang="ko-KR" altLang="en-US" sz="1800">
               <a:latin typeface="맑은 고딕" charset="0"/>
@@ -9687,16 +10804,787 @@
           </a:p>
         </p:txBody>
       </p:sp>
+      <p:pic>
+        <p:nvPicPr>
+          <p:cNvPr id="73" name="그림 20" descr="C:/Users/Admin1/AppData/Roaming/PolarisOffice/ETemp/34236_8196696/fImage31481995724.png"/>
+          <p:cNvPicPr>
+            <a:picLocks noChangeAspect="1"/>
+          </p:cNvPicPr>
+          <p:nvPr/>
+        </p:nvPicPr>
+        <p:blipFill rotWithShape="1">
+          <a:blip r:embed="rId3" cstate="print">
+            <a:extLst>
+              <a:ext uri="{28A0092B-C50C-407E-A947-70E740481C1C}">
+                <a14:useLocalDpi xmlns:a14="http://schemas.microsoft.com/office/drawing/2010/main" val="0"/>
+              </a:ext>
+            </a:extLst>
+          </a:blip>
+          <a:stretch>
+            <a:fillRect/>
+          </a:stretch>
+        </p:blipFill>
+        <p:spPr>
+          <a:xfrm rot="0">
+            <a:off x="1231900" y="4479290"/>
+            <a:ext cx="4152265" cy="879475"/>
+          </a:xfrm>
+          <a:prstGeom prst="roundRect"/>
+          <a:solidFill>
+            <a:srgbClr val="EDEDED"/>
+          </a:solidFill>
+        </p:spPr>
+      </p:pic>
+      <p:sp>
+        <p:nvSpPr>
+          <p:cNvPr id="75" name="텍스트 상자 24"/>
+          <p:cNvSpPr txBox="1">
+            <a:spLocks/>
+          </p:cNvSpPr>
+          <p:nvPr/>
+        </p:nvSpPr>
+        <p:spPr>
+          <a:xfrm rot="0">
+            <a:off x="6813550" y="2675890"/>
+            <a:ext cx="4152265" cy="1231265"/>
+          </a:xfrm>
+          <a:prstGeom prst="rect"/>
+          <a:noFill/>
+          <a:ln w="0">
+            <a:noFill/>
+            <a:prstDash/>
+          </a:ln>
+        </p:spPr>
+        <p:txBody>
+          <a:bodyPr wrap="square" lIns="89535" tIns="46355" rIns="89535" bIns="46355" numCol="1" vert="horz" anchor="t">
+            <a:spAutoFit/>
+          </a:bodyPr>
+          <a:lstStyle/>
+          <a:p>
+            <a:pPr marL="0" indent="0" rtl="0" algn="l" defTabSz="914400" eaLnBrk="1" latinLnBrk="0" hangingPunct="1">
+              <a:buFontTx/>
+              <a:buNone/>
+            </a:pPr>
+            <a:r>
+              <a:rPr lang="ko-KR" sz="2000" b="1">
+                <a:solidFill>
+                  <a:srgbClr val="0611F2"/>
+                </a:solidFill>
+                <a:latin typeface="맑은 고딕" charset="0"/>
+                <a:ea typeface="맑은 고딕" charset="0"/>
+              </a:rPr>
+              <a:t>2</a:t>
+            </a:r>
+            <a:r>
+              <a:rPr lang="ko-KR" sz="2000" b="1">
+                <a:solidFill>
+                  <a:srgbClr val="0611F2"/>
+                </a:solidFill>
+                <a:latin typeface="맑은 고딕" charset="0"/>
+                <a:ea typeface="맑은 고딕" charset="0"/>
+              </a:rPr>
+              <a:t>3</a:t>
+            </a:r>
+            <a:r>
+              <a:rPr sz="2000" b="1">
+                <a:solidFill>
+                  <a:srgbClr val="0611F2"/>
+                </a:solidFill>
+                <a:latin typeface="맑은 고딕" charset="0"/>
+                <a:ea typeface="맑은 고딕" charset="0"/>
+              </a:rPr>
+              <a:t>.</a:t>
+            </a:r>
+            <a:r>
+              <a:rPr lang="ko-KR" sz="2000" b="1">
+                <a:solidFill>
+                  <a:srgbClr val="0611F2"/>
+                </a:solidFill>
+                <a:latin typeface="맑은 고딕" charset="0"/>
+                <a:ea typeface="맑은 고딕" charset="0"/>
+              </a:rPr>
+              <a:t> </a:t>
+            </a:r>
+            <a:r>
+              <a:rPr lang="ko-KR" sz="1800">
+                <a:latin typeface="맑은 고딕" charset="0"/>
+                <a:ea typeface="맑은 고딕" charset="0"/>
+              </a:rPr>
+              <a:t>그러고 나서 Project 폴더 아래에 </a:t>
+            </a:r>
+            <a:r>
+              <a:rPr lang="ko-KR" sz="1800">
+                <a:latin typeface="맑은 고딕" charset="0"/>
+                <a:ea typeface="맑은 고딕" charset="0"/>
+              </a:rPr>
+              <a:t>있는</a:t>
+            </a:r>
+            <a:r>
+              <a:rPr lang="ko-KR" sz="1800">
+                <a:latin typeface="맑은 고딕" charset="0"/>
+                <a:ea typeface="맑은 고딕" charset="0"/>
+              </a:rPr>
+              <a:t> </a:t>
+            </a:r>
+            <a:r>
+              <a:rPr lang="ko-KR" sz="1800">
+                <a:latin typeface="맑은 고딕" charset="0"/>
+                <a:ea typeface="맑은 고딕" charset="0"/>
+              </a:rPr>
+              <a:t>Texture</a:t>
+            </a:r>
+            <a:r>
+              <a:rPr lang="ko-KR" sz="1800">
+                <a:latin typeface="맑은 고딕" charset="0"/>
+                <a:ea typeface="맑은 고딕" charset="0"/>
+              </a:rPr>
+              <a:t> </a:t>
+            </a:r>
+            <a:r>
+              <a:rPr lang="ko-KR" sz="1800">
+                <a:latin typeface="맑은 고딕" charset="0"/>
+                <a:ea typeface="맑은 고딕" charset="0"/>
+              </a:rPr>
+              <a:t>폴더에</a:t>
+            </a:r>
+            <a:r>
+              <a:rPr lang="ko-KR" sz="1800">
+                <a:latin typeface="맑은 고딕" charset="0"/>
+                <a:ea typeface="맑은 고딕" charset="0"/>
+              </a:rPr>
+              <a:t> Billiard Ball Three </a:t>
+            </a:r>
+            <a:r>
+              <a:rPr lang="ko-KR" sz="1800">
+                <a:latin typeface="맑은 고딕" charset="0"/>
+                <a:ea typeface="맑은 고딕" charset="0"/>
+              </a:rPr>
+              <a:t>텍스처를</a:t>
+            </a:r>
+            <a:r>
+              <a:rPr lang="ko-KR" sz="1800">
+                <a:latin typeface="맑은 고딕" charset="0"/>
+                <a:ea typeface="맑은 고딕" charset="0"/>
+              </a:rPr>
+              <a:t> </a:t>
+            </a:r>
+            <a:r>
+              <a:rPr lang="ko-KR" sz="1800">
+                <a:latin typeface="맑은 고딕" charset="0"/>
+                <a:ea typeface="맑은 고딕" charset="0"/>
+              </a:rPr>
+              <a:t>Billiard</a:t>
+            </a:r>
+            <a:r>
+              <a:rPr lang="ko-KR" sz="1800">
+                <a:latin typeface="맑은 고딕" charset="0"/>
+                <a:ea typeface="맑은 고딕" charset="0"/>
+              </a:rPr>
+              <a:t> Ball (Three) </a:t>
+            </a:r>
+            <a:r>
+              <a:rPr lang="ko-KR" sz="1800">
+                <a:latin typeface="맑은 고딕" charset="0"/>
+                <a:ea typeface="맑은 고딕" charset="0"/>
+              </a:rPr>
+              <a:t>오브젝트에</a:t>
+            </a:r>
+            <a:r>
+              <a:rPr lang="ko-KR" sz="1800">
+                <a:latin typeface="맑은 고딕" charset="0"/>
+                <a:ea typeface="맑은 고딕" charset="0"/>
+              </a:rPr>
+              <a:t> </a:t>
+            </a:r>
+            <a:r>
+              <a:rPr lang="ko-KR" sz="1800">
+                <a:latin typeface="맑은 고딕" charset="0"/>
+                <a:ea typeface="맑은 고딕" charset="0"/>
+              </a:rPr>
+              <a:t>넣어줍니다.</a:t>
+            </a:r>
+            <a:endParaRPr lang="ko-KR" altLang="en-US" sz="1800">
+              <a:latin typeface="맑은 고딕" charset="0"/>
+              <a:ea typeface="맑은 고딕" charset="0"/>
+            </a:endParaRPr>
+          </a:p>
+        </p:txBody>
+      </p:sp>
+      <p:pic>
+        <p:nvPicPr>
+          <p:cNvPr id="78" name="그림 29" descr="C:/Users/Admin1/AppData/Roaming/PolarisOffice/ETemp/34236_8196696/fImage134742041478.png"/>
+          <p:cNvPicPr>
+            <a:picLocks noChangeAspect="1"/>
+          </p:cNvPicPr>
+          <p:nvPr/>
+        </p:nvPicPr>
+        <p:blipFill rotWithShape="1">
+          <a:blip r:embed="rId4" cstate="print">
+            <a:extLst>
+              <a:ext uri="{28A0092B-C50C-407E-A947-70E740481C1C}">
+                <a14:useLocalDpi xmlns:a14="http://schemas.microsoft.com/office/drawing/2010/main" val="0"/>
+              </a:ext>
+            </a:extLst>
+          </a:blip>
+          <a:stretch>
+            <a:fillRect/>
+          </a:stretch>
+        </p:blipFill>
+        <p:spPr>
+          <a:xfrm rot="0">
+            <a:off x="6832600" y="4022725"/>
+            <a:ext cx="4133215" cy="1378585"/>
+          </a:xfrm>
+          <a:prstGeom prst="roundRect"/>
+          <a:solidFill>
+            <a:srgbClr val="EDEDED"/>
+          </a:solidFill>
+        </p:spPr>
+      </p:pic>
+      <p:pic>
+        <p:nvPicPr>
+          <p:cNvPr id="79" name="그림 32" descr="C:/Users/Admin1/AppData/Roaming/PolarisOffice/ETemp/34236_8196696/fImage73492059358.png"/>
+          <p:cNvPicPr>
+            <a:picLocks noChangeAspect="1"/>
+          </p:cNvPicPr>
+          <p:nvPr/>
+        </p:nvPicPr>
+        <p:blipFill rotWithShape="1">
+          <a:blip r:embed="rId5" cstate="print">
+            <a:extLst>
+              <a:ext uri="{28A0092B-C50C-407E-A947-70E740481C1C}">
+                <a14:useLocalDpi xmlns:a14="http://schemas.microsoft.com/office/drawing/2010/main" val="0"/>
+              </a:ext>
+            </a:extLst>
+          </a:blip>
+          <a:stretch>
+            <a:fillRect/>
+          </a:stretch>
+        </p:blipFill>
+        <p:spPr>
+          <a:xfrm rot="0">
+            <a:off x="6833870" y="1440180"/>
+            <a:ext cx="1246505" cy="1162050"/>
+          </a:xfrm>
+          <a:prstGeom prst="roundRect"/>
+          <a:solidFill>
+            <a:srgbClr val="EDEDED"/>
+          </a:solidFill>
+        </p:spPr>
+      </p:pic>
+      <p:pic>
+        <p:nvPicPr>
+          <p:cNvPr id="80" name="그림 35" descr="C:/Users/Admin1/AppData/Roaming/PolarisOffice/ETemp/34236_8196696/fImage149972066962.png"/>
+          <p:cNvPicPr>
+            <a:picLocks noChangeAspect="1"/>
+          </p:cNvPicPr>
+          <p:nvPr/>
+        </p:nvPicPr>
+        <p:blipFill rotWithShape="1">
+          <a:blip r:embed="rId6" cstate="print">
+            <a:extLst>
+              <a:ext uri="{28A0092B-C50C-407E-A947-70E740481C1C}">
+                <a14:useLocalDpi xmlns:a14="http://schemas.microsoft.com/office/drawing/2010/main" val="0"/>
+              </a:ext>
+            </a:extLst>
+          </a:blip>
+          <a:stretch>
+            <a:fillRect/>
+          </a:stretch>
+        </p:blipFill>
+        <p:spPr>
+          <a:xfrm rot="0">
+            <a:off x="8226425" y="1438275"/>
+            <a:ext cx="2739390" cy="1163320"/>
+          </a:xfrm>
+          <a:prstGeom prst="roundRect"/>
+          <a:solidFill>
+            <a:srgbClr val="EDEDED"/>
+          </a:solidFill>
+        </p:spPr>
+      </p:pic>
       <p:cxnSp>
         <p:nvCxnSpPr>
-          <p:cNvPr id="64" name="도형 31"/>
+          <p:cNvPr id="81" name="도형 38"/>
           <p:cNvCxnSpPr/>
           <p:nvPr/>
         </p:nvCxnSpPr>
         <p:spPr>
-          <a:xfrm rot="0" flipV="1">
-            <a:off x="8217535" y="2207895"/>
-            <a:ext cx="2667635" cy="996315"/>
+          <a:xfrm rot="0" flipH="1">
+            <a:off x="8002270" y="2153285"/>
+            <a:ext cx="819150" cy="9525"/>
+          </a:xfrm>
+          <a:prstGeom prst="straightConnector1"/>
+          <a:ln w="6350" cap="flat" cmpd="sng">
+            <a:prstDash/>
+            <a:headEnd type="none" w="med" len="med"/>
+            <a:tailEnd type="triangle" w="med" len="med"/>
+          </a:ln>
+        </p:spPr>
+        <p:style>
+          <a:lnRef idx="1">
+            <a:schemeClr val="accent1"/>
+          </a:lnRef>
+          <a:fillRef idx="0">
+            <a:schemeClr val="accent1"/>
+          </a:fillRef>
+          <a:effectRef idx="0">
+            <a:schemeClr val="accent1"/>
+          </a:effectRef>
+          <a:fontRef idx="minor">
+            <a:schemeClr val="tx1"/>
+          </a:fontRef>
+        </p:style>
+      </p:cxnSp>
+    </p:spTree>
+  </p:cSld>
+  <p:clrMapOvr>
+    <a:masterClrMapping/>
+  </p:clrMapOvr>
+  <mc:AlternateContent xmlns:mc="http://schemas.openxmlformats.org/markup-compatibility/2006">
+    <mc:Choice xmlns:p14="http://schemas.microsoft.com/office/powerpoint/2010/main" Requires="p14">
+      <p:transition spd="slow" p14:dur="1000"/>
+    </mc:Choice>
+    <mc:Fallback>
+      <p:transition spd="slow"/>
+    </mc:Fallback>
+  </mc:AlternateContent>
+  <p:timing>
+    <p:tnLst>
+      <p:par>
+        <p:cTn id="1" dur="indefinite" restart="never" nodeType="tmRoot"/>
+      </p:par>
+    </p:tnLst>
+  </p:timing>
+</p:sld>
+</file>
+
+<file path=ppt/slides/slide8.xml><?xml version="1.0" encoding="utf-8"?>
+<p:sld xmlns:a="http://schemas.openxmlformats.org/drawingml/2006/main" xmlns:r="http://schemas.openxmlformats.org/officeDocument/2006/relationships" xmlns:p="http://schemas.openxmlformats.org/presentationml/2006/main">
+  <p:cSld>
+    <p:spTree>
+      <p:nvGrpSpPr>
+        <p:cNvPr id="1" name=""/>
+        <p:cNvGrpSpPr/>
+        <p:nvPr/>
+      </p:nvGrpSpPr>
+      <p:grpSpPr>
+        <a:xfrm>
+          <a:off x="0" y="0"/>
+          <a:ext cx="0" cy="0"/>
+          <a:chOff x="0" y="0"/>
+          <a:chExt cx="0" cy="0"/>
+        </a:xfrm>
+      </p:grpSpPr>
+      <p:sp>
+        <p:nvSpPr>
+          <p:cNvPr id="2" name="Rect 0"/>
+          <p:cNvSpPr txBox="1">
+            <a:spLocks/>
+          </p:cNvSpPr>
+          <p:nvPr/>
+        </p:nvSpPr>
+        <p:spPr>
+          <a:xfrm rot="0">
+            <a:off x="4236085" y="419735"/>
+            <a:ext cx="3716655" cy="478155"/>
+          </a:xfrm>
+          <a:prstGeom prst="rect"/>
+          <a:noFill/>
+          <a:ln w="0">
+            <a:noFill/>
+            <a:prstDash/>
+          </a:ln>
+        </p:spPr>
+        <p:txBody>
+          <a:bodyPr wrap="square" lIns="89535" tIns="46355" rIns="89535" bIns="46355" numCol="1" vert="horz" anchor="t">
+            <a:spAutoFit/>
+          </a:bodyPr>
+          <a:lstStyle/>
+          <a:p>
+            <a:pPr marL="0" indent="0" rtl="0" algn="ctr" defTabSz="914400" eaLnBrk="1" latinLnBrk="0" hangingPunct="1">
+              <a:buFontTx/>
+              <a:buNone/>
+            </a:pPr>
+            <a:r>
+              <a:rPr lang="ko-KR" sz="2500" b="1">
+                <a:solidFill>
+                  <a:schemeClr val="tx1"/>
+                </a:solidFill>
+                <a:latin typeface="나눔바른고딕" charset="0"/>
+                <a:ea typeface="나눔바른고딕" charset="0"/>
+              </a:rPr>
+              <a:t>여덟</a:t>
+            </a:r>
+            <a:r>
+              <a:rPr lang="ko-KR" sz="2500" b="1">
+                <a:solidFill>
+                  <a:schemeClr val="tx1"/>
+                </a:solidFill>
+                <a:latin typeface="나눔바른고딕" charset="0"/>
+                <a:ea typeface="나눔바른고딕" charset="0"/>
+              </a:rPr>
+              <a:t> 번째 튜토리얼</a:t>
+            </a:r>
+            <a:endParaRPr lang="ko-KR" altLang="en-US" sz="2500" b="1">
+              <a:solidFill>
+                <a:schemeClr val="tx1"/>
+              </a:solidFill>
+              <a:latin typeface="나눔바른고딕" charset="0"/>
+              <a:ea typeface="나눔바른고딕" charset="0"/>
+            </a:endParaRPr>
+          </a:p>
+        </p:txBody>
+      </p:sp>
+      <p:sp>
+        <p:nvSpPr>
+          <p:cNvPr id="48" name="Rect 0"/>
+          <p:cNvSpPr txBox="1">
+            <a:spLocks/>
+          </p:cNvSpPr>
+          <p:nvPr/>
+        </p:nvSpPr>
+        <p:spPr>
+          <a:xfrm rot="0">
+            <a:off x="1249045" y="4919980"/>
+            <a:ext cx="4142740" cy="1231265"/>
+          </a:xfrm>
+          <a:prstGeom prst="rect"/>
+          <a:noFill/>
+          <a:ln w="0">
+            <a:noFill/>
+            <a:prstDash/>
+          </a:ln>
+        </p:spPr>
+        <p:txBody>
+          <a:bodyPr wrap="square" lIns="89535" tIns="46355" rIns="89535" bIns="46355" numCol="1" vert="horz" anchor="t">
+            <a:spAutoFit/>
+          </a:bodyPr>
+          <a:lstStyle/>
+          <a:p>
+            <a:pPr marL="0" indent="0" rtl="0" algn="l" defTabSz="914400" eaLnBrk="1" latinLnBrk="0" hangingPunct="1">
+              <a:buFontTx/>
+              <a:buNone/>
+            </a:pPr>
+            <a:r>
+              <a:rPr lang="ko-KR" sz="2000" b="1">
+                <a:solidFill>
+                  <a:srgbClr val="0611F2"/>
+                </a:solidFill>
+                <a:latin typeface="맑은 고딕" charset="0"/>
+                <a:ea typeface="맑은 고딕" charset="0"/>
+              </a:rPr>
+              <a:t>26</a:t>
+            </a:r>
+            <a:r>
+              <a:rPr sz="2000" b="1">
+                <a:solidFill>
+                  <a:srgbClr val="0611F2"/>
+                </a:solidFill>
+                <a:latin typeface="맑은 고딕" charset="0"/>
+                <a:ea typeface="맑은 고딕" charset="0"/>
+              </a:rPr>
+              <a:t>.</a:t>
+            </a:r>
+            <a:r>
+              <a:rPr lang="ko-KR" sz="2000" b="1">
+                <a:solidFill>
+                  <a:srgbClr val="0611F2"/>
+                </a:solidFill>
+                <a:latin typeface="맑은 고딕" charset="0"/>
+                <a:ea typeface="맑은 고딕" charset="0"/>
+              </a:rPr>
+              <a:t> </a:t>
+            </a:r>
+            <a:r>
+              <a:rPr lang="ko-KR" sz="1800">
+                <a:latin typeface="맑은 고딕" charset="0"/>
+                <a:ea typeface="맑은 고딕" charset="0"/>
+              </a:rPr>
+              <a:t>그런 다음 Project 폴더 아래에 </a:t>
+            </a:r>
+            <a:r>
+              <a:rPr lang="ko-KR" sz="1800">
+                <a:latin typeface="맑은 고딕" charset="0"/>
+                <a:ea typeface="맑은 고딕" charset="0"/>
+              </a:rPr>
+              <a:t>있는</a:t>
+            </a:r>
+            <a:r>
+              <a:rPr lang="ko-KR" sz="1800">
+                <a:latin typeface="맑은 고딕" charset="0"/>
+                <a:ea typeface="맑은 고딕" charset="0"/>
+              </a:rPr>
+              <a:t> </a:t>
+            </a:r>
+            <a:r>
+              <a:rPr lang="ko-KR" sz="1800">
+                <a:latin typeface="맑은 고딕" charset="0"/>
+                <a:ea typeface="맑은 고딕" charset="0"/>
+              </a:rPr>
+              <a:t>Texture 폴더에 Scout Robot </a:t>
+            </a:r>
+            <a:r>
+              <a:rPr lang="ko-KR" sz="1800">
+                <a:latin typeface="맑은 고딕" charset="0"/>
+                <a:ea typeface="맑은 고딕" charset="0"/>
+              </a:rPr>
+              <a:t>텍스처</a:t>
+            </a:r>
+            <a:r>
+              <a:rPr lang="ko-KR" sz="1800">
+                <a:latin typeface="맑은 고딕" charset="0"/>
+                <a:ea typeface="맑은 고딕" charset="0"/>
+              </a:rPr>
+              <a:t>를</a:t>
+            </a:r>
+            <a:r>
+              <a:rPr lang="ko-KR" sz="1800">
+                <a:latin typeface="맑은 고딕" charset="0"/>
+                <a:ea typeface="맑은 고딕" charset="0"/>
+              </a:rPr>
+              <a:t> </a:t>
+            </a:r>
+            <a:r>
+              <a:rPr lang="ko-KR" sz="1800">
+                <a:latin typeface="맑은 고딕" charset="0"/>
+                <a:ea typeface="맑은 고딕" charset="0"/>
+              </a:rPr>
+              <a:t>Scout Robot 오브젝트에 </a:t>
+            </a:r>
+            <a:r>
+              <a:rPr lang="ko-KR" sz="1800">
+                <a:latin typeface="맑은 고딕" charset="0"/>
+                <a:ea typeface="맑은 고딕" charset="0"/>
+              </a:rPr>
+              <a:t>넣어</a:t>
+            </a:r>
+            <a:r>
+              <a:rPr lang="ko-KR" sz="1800">
+                <a:latin typeface="맑은 고딕" charset="0"/>
+                <a:ea typeface="맑은 고딕" charset="0"/>
+              </a:rPr>
+              <a:t>줍니다.</a:t>
+            </a:r>
+            <a:endParaRPr lang="ko-KR" altLang="en-US" sz="1800">
+              <a:latin typeface="맑은 고딕" charset="0"/>
+              <a:ea typeface="맑은 고딕" charset="0"/>
+            </a:endParaRPr>
+          </a:p>
+        </p:txBody>
+      </p:sp>
+      <p:sp>
+        <p:nvSpPr>
+          <p:cNvPr id="72" name="Rect 0"/>
+          <p:cNvSpPr txBox="1">
+            <a:spLocks/>
+          </p:cNvSpPr>
+          <p:nvPr/>
+        </p:nvSpPr>
+        <p:spPr>
+          <a:xfrm rot="0">
+            <a:off x="1252220" y="2548890"/>
+            <a:ext cx="4141470" cy="954405"/>
+          </a:xfrm>
+          <a:prstGeom prst="rect"/>
+          <a:noFill/>
+          <a:ln w="0">
+            <a:noFill/>
+            <a:prstDash/>
+          </a:ln>
+        </p:spPr>
+        <p:txBody>
+          <a:bodyPr wrap="square" lIns="89535" tIns="46355" rIns="89535" bIns="46355" numCol="1" vert="horz" anchor="t">
+            <a:spAutoFit/>
+          </a:bodyPr>
+          <a:lstStyle/>
+          <a:p>
+            <a:pPr marL="0" indent="0" rtl="0" algn="l" defTabSz="914400" eaLnBrk="1" latinLnBrk="0" hangingPunct="1">
+              <a:buFontTx/>
+              <a:buNone/>
+            </a:pPr>
+            <a:r>
+              <a:rPr lang="ko-KR" sz="2000" b="1">
+                <a:solidFill>
+                  <a:srgbClr val="0611F2"/>
+                </a:solidFill>
+                <a:latin typeface="맑은 고딕" charset="0"/>
+                <a:ea typeface="맑은 고딕" charset="0"/>
+              </a:rPr>
+              <a:t>25</a:t>
+            </a:r>
+            <a:r>
+              <a:rPr sz="2000" b="1">
+                <a:solidFill>
+                  <a:srgbClr val="0611F2"/>
+                </a:solidFill>
+                <a:latin typeface="맑은 고딕" charset="0"/>
+                <a:ea typeface="맑은 고딕" charset="0"/>
+              </a:rPr>
+              <a:t>.</a:t>
+            </a:r>
+            <a:r>
+              <a:rPr lang="ko-KR" sz="2000" b="1">
+                <a:solidFill>
+                  <a:srgbClr val="0611F2"/>
+                </a:solidFill>
+                <a:latin typeface="맑은 고딕" charset="0"/>
+                <a:ea typeface="맑은 고딕" charset="0"/>
+              </a:rPr>
+              <a:t> </a:t>
+            </a:r>
+            <a:r>
+              <a:rPr lang="ko-KR" sz="1800">
+                <a:latin typeface="맑은 고딕" charset="0"/>
+                <a:ea typeface="맑은 고딕" charset="0"/>
+              </a:rPr>
+              <a:t>그리고 Billiard Ball (One) </a:t>
+            </a:r>
+            <a:r>
+              <a:rPr lang="ko-KR" sz="1800">
+                <a:latin typeface="맑은 고딕" charset="0"/>
+                <a:ea typeface="맑은 고딕" charset="0"/>
+              </a:rPr>
+              <a:t>오브젝트의</a:t>
+            </a:r>
+            <a:r>
+              <a:rPr lang="ko-KR" sz="1800">
+                <a:latin typeface="맑은 고딕" charset="0"/>
+                <a:ea typeface="맑은 고딕" charset="0"/>
+              </a:rPr>
+              <a:t> </a:t>
+            </a:r>
+            <a:r>
+              <a:rPr lang="ko-KR" sz="1800">
+                <a:latin typeface="맑은 고딕" charset="0"/>
+                <a:ea typeface="맑은 고딕" charset="0"/>
+              </a:rPr>
+              <a:t>Tag를 Billiard Ball로 </a:t>
+            </a:r>
+            <a:r>
+              <a:rPr lang="ko-KR" sz="1800">
+                <a:latin typeface="맑은 고딕" charset="0"/>
+                <a:ea typeface="맑은 고딕" charset="0"/>
+              </a:rPr>
+              <a:t>설정합니</a:t>
+            </a:r>
+            <a:r>
+              <a:rPr lang="ko-KR" sz="1800">
+                <a:latin typeface="맑은 고딕" charset="0"/>
+                <a:ea typeface="맑은 고딕" charset="0"/>
+              </a:rPr>
+              <a:t>다.</a:t>
+            </a:r>
+            <a:endParaRPr lang="ko-KR" altLang="en-US" sz="1800">
+              <a:latin typeface="맑은 고딕" charset="0"/>
+              <a:ea typeface="맑은 고딕" charset="0"/>
+            </a:endParaRPr>
+          </a:p>
+        </p:txBody>
+      </p:sp>
+      <p:pic>
+        <p:nvPicPr>
+          <p:cNvPr id="82" name="그림 42" descr="C:/Users/Admin1/AppData/Roaming/PolarisOffice/ETemp/34236_8196696/fImage51552204464.png"/>
+          <p:cNvPicPr>
+            <a:picLocks noChangeAspect="1"/>
+          </p:cNvPicPr>
+          <p:nvPr/>
+        </p:nvPicPr>
+        <p:blipFill rotWithShape="1">
+          <a:blip r:embed="rId2" cstate="print">
+            <a:extLst>
+              <a:ext uri="{28A0092B-C50C-407E-A947-70E740481C1C}">
+                <a14:useLocalDpi xmlns:a14="http://schemas.microsoft.com/office/drawing/2010/main" val="0"/>
+              </a:ext>
+            </a:extLst>
+          </a:blip>
+          <a:stretch>
+            <a:fillRect/>
+          </a:stretch>
+        </p:blipFill>
+        <p:spPr>
+          <a:xfrm rot="0">
+            <a:off x="1244600" y="1447165"/>
+            <a:ext cx="4131310" cy="991235"/>
+          </a:xfrm>
+          <a:prstGeom prst="roundRect"/>
+          <a:solidFill>
+            <a:srgbClr val="EDEDED"/>
+          </a:solidFill>
+        </p:spPr>
+      </p:pic>
+      <p:pic>
+        <p:nvPicPr>
+          <p:cNvPr id="83" name="그림 45" descr="C:/Users/Admin1/AppData/Roaming/PolarisOffice/ETemp/34236_8196696/fImage73732215705.png"/>
+          <p:cNvPicPr>
+            <a:picLocks noChangeAspect="1"/>
+          </p:cNvPicPr>
+          <p:nvPr/>
+        </p:nvPicPr>
+        <p:blipFill rotWithShape="1">
+          <a:blip r:embed="rId3" cstate="print">
+            <a:extLst>
+              <a:ext uri="{28A0092B-C50C-407E-A947-70E740481C1C}">
+                <a14:useLocalDpi xmlns:a14="http://schemas.microsoft.com/office/drawing/2010/main" val="0"/>
+              </a:ext>
+            </a:extLst>
+          </a:blip>
+          <a:stretch>
+            <a:fillRect/>
+          </a:stretch>
+        </p:blipFill>
+        <p:spPr>
+          <a:xfrm rot="0">
+            <a:off x="1240790" y="3658235"/>
+            <a:ext cx="1361440" cy="1174115"/>
+          </a:xfrm>
+          <a:prstGeom prst="roundRect"/>
+          <a:solidFill>
+            <a:srgbClr val="EDEDED"/>
+          </a:solidFill>
+        </p:spPr>
+      </p:pic>
+      <p:pic>
+        <p:nvPicPr>
+          <p:cNvPr id="84" name="그림 48" descr="C:/Users/Admin1/AppData/Roaming/PolarisOffice/ETemp/34236_8196696/fImage149342228145.png"/>
+          <p:cNvPicPr>
+            <a:picLocks noChangeAspect="1"/>
+          </p:cNvPicPr>
+          <p:nvPr/>
+        </p:nvPicPr>
+        <p:blipFill rotWithShape="1">
+          <a:blip r:embed="rId4" cstate="print">
+            <a:extLst>
+              <a:ext uri="{28A0092B-C50C-407E-A947-70E740481C1C}">
+                <a14:useLocalDpi xmlns:a14="http://schemas.microsoft.com/office/drawing/2010/main" val="0"/>
+              </a:ext>
+            </a:extLst>
+          </a:blip>
+          <a:stretch>
+            <a:fillRect/>
+          </a:stretch>
+        </p:blipFill>
+        <p:spPr>
+          <a:xfrm rot="0">
+            <a:off x="2730500" y="3669665"/>
+            <a:ext cx="2653665" cy="1163320"/>
+          </a:xfrm>
+          <a:prstGeom prst="roundRect"/>
+          <a:solidFill>
+            <a:srgbClr val="EDEDED"/>
+          </a:solidFill>
+        </p:spPr>
+      </p:pic>
+      <p:cxnSp>
+        <p:nvCxnSpPr>
+          <p:cNvPr id="85" name="도형 51"/>
+          <p:cNvCxnSpPr/>
+          <p:nvPr/>
+        </p:nvCxnSpPr>
+        <p:spPr>
+          <a:xfrm rot="0" flipH="1">
+            <a:off x="2222500" y="4091305"/>
+            <a:ext cx="2610485" cy="508635"/>
           </a:xfrm>
           <a:prstGeom prst="straightConnector1"/>
           <a:ln w="6350" cap="flat" cmpd="sng">
@@ -9722,7 +11610,7 @@
       </p:cxnSp>
       <p:sp>
         <p:nvSpPr>
-          <p:cNvPr id="65" name="텍스트 상자 15"/>
+          <p:cNvPr id="86" name="텍스트 상자 53"/>
           <p:cNvSpPr txBox="1">
             <a:spLocks/>
           </p:cNvSpPr>
@@ -9730,8 +11618,8 @@
         </p:nvSpPr>
         <p:spPr>
           <a:xfrm rot="0">
-            <a:off x="1320165" y="5471160"/>
-            <a:ext cx="4038600" cy="677545"/>
+            <a:off x="6822440" y="5227955"/>
+            <a:ext cx="4119245" cy="923925"/>
           </a:xfrm>
           <a:prstGeom prst="rect"/>
           <a:noFill/>
@@ -9741,7 +11629,7 @@
           </a:ln>
         </p:spPr>
         <p:txBody>
-          <a:bodyPr wrap="square" lIns="89535" tIns="46355" rIns="89535" bIns="46355" numCol="1" vert="horz" anchor="t">
+          <a:bodyPr wrap="square" lIns="89535" tIns="46355" rIns="89535" bIns="46355" vert="horz" anchor="t">
             <a:spAutoFit/>
           </a:bodyPr>
           <a:lstStyle/>
@@ -9751,55 +11639,76 @@
               <a:buNone/>
             </a:pPr>
             <a:r>
-              <a:rPr lang="ko-KR" sz="2000" b="1">
+              <a:rPr sz="1800" b="1">
                 <a:solidFill>
                   <a:srgbClr val="0611F2"/>
                 </a:solidFill>
                 <a:latin typeface="맑은 고딕" charset="0"/>
                 <a:ea typeface="맑은 고딕" charset="0"/>
               </a:rPr>
-              <a:t>28</a:t>
-            </a:r>
-            <a:r>
-              <a:rPr sz="2000" b="1">
+              <a:t>2</a:t>
+            </a:r>
+            <a:r>
+              <a:rPr sz="1800" b="1">
                 <a:solidFill>
                   <a:srgbClr val="0611F2"/>
                 </a:solidFill>
                 <a:latin typeface="맑은 고딕" charset="0"/>
                 <a:ea typeface="맑은 고딕" charset="0"/>
               </a:rPr>
-              <a:t>.</a:t>
-            </a:r>
-            <a:r>
-              <a:rPr sz="2000" b="1">
+              <a:t>7</a:t>
+            </a:r>
+            <a:r>
+              <a:rPr sz="1800" b="1">
                 <a:solidFill>
                   <a:srgbClr val="0611F2"/>
                 </a:solidFill>
                 <a:latin typeface="맑은 고딕" charset="0"/>
                 <a:ea typeface="맑은 고딕" charset="0"/>
               </a:rPr>
+              <a:t>.</a:t>
+            </a:r>
+            <a:r>
+              <a:rPr sz="1800">
+                <a:latin typeface="맑은 고딕" charset="0"/>
+                <a:ea typeface="맑은 고딕" charset="0"/>
+              </a:rPr>
+              <a:t> 그다음으로 C# Script를 생성한 </a:t>
+            </a:r>
+            <a:r>
+              <a:rPr sz="1800">
+                <a:latin typeface="맑은 고딕" charset="0"/>
+                <a:ea typeface="맑은 고딕" charset="0"/>
+              </a:rPr>
+              <a:t>다음</a:t>
+            </a:r>
+            <a:r>
+              <a:rPr sz="1800">
+                <a:latin typeface="맑은 고딕" charset="0"/>
+                <a:ea typeface="맑은 고딕" charset="0"/>
+              </a:rPr>
               <a:t> </a:t>
             </a:r>
             <a:r>
-              <a:rPr lang="ko-KR" sz="1800">
-                <a:latin typeface="맑은 고딕" charset="0"/>
-                <a:ea typeface="맑은 고딕" charset="0"/>
-              </a:rPr>
-              <a:t>그리고 Project 폴더에서 Physic </a:t>
-            </a:r>
-            <a:r>
-              <a:rPr lang="ko-KR" sz="1800">
-                <a:latin typeface="맑은 고딕" charset="0"/>
-                <a:ea typeface="맑은 고딕" charset="0"/>
-              </a:rPr>
-              <a:t>Material을</a:t>
-            </a:r>
-            <a:r>
-              <a:rPr lang="ko-KR" sz="1800">
-                <a:latin typeface="맑은 고딕" charset="0"/>
-                <a:ea typeface="맑은 고딕" charset="0"/>
-              </a:rPr>
-              <a:t> 생성합니다.</a:t>
+              <a:rPr sz="1800">
+                <a:latin typeface="맑은 고딕" charset="0"/>
+                <a:ea typeface="맑은 고딕" charset="0"/>
+              </a:rPr>
+              <a:t>RobotControl 이라는</a:t>
+            </a:r>
+            <a:r>
+              <a:rPr sz="1800">
+                <a:latin typeface="맑은 고딕" charset="0"/>
+                <a:ea typeface="맑은 고딕" charset="0"/>
+              </a:rPr>
+              <a:t> 이름으로 </a:t>
+            </a:r>
+            <a:r>
+              <a:rPr sz="1800">
+                <a:latin typeface="맑은 고딕" charset="0"/>
+                <a:ea typeface="맑은 고딕" charset="0"/>
+              </a:rPr>
+              <a:t>정의합니다.</a:t>
             </a:r>
             <a:endParaRPr lang="ko-KR" altLang="en-US" sz="1800">
               <a:latin typeface="맑은 고딕" charset="0"/>
@@ -9810,14 +11719,14 @@
       </p:sp>
       <p:pic>
         <p:nvPicPr>
-          <p:cNvPr id="66" name="그림 16" descr="C:/Users/Admin1/AppData/Roaming/PolarisOffice/ETemp/20324_11685168/fImage415872006500.png"/>
+          <p:cNvPr id="87" name="그림 54" descr="C:/Users/Admin1/AppData/Roaming/PolarisOffice/ETemp/34236_8196696/fImage82892273281.png"/>
           <p:cNvPicPr>
             <a:picLocks noChangeAspect="1"/>
           </p:cNvPicPr>
           <p:nvPr/>
         </p:nvPicPr>
         <p:blipFill rotWithShape="1">
-          <a:blip r:embed="rId6" cstate="hqprint">
+          <a:blip r:embed="rId5" cstate="hqprint">
             <a:extLst>
               <a:ext uri="{28A0092B-C50C-407E-A947-70E740481C1C}">
                 <a14:useLocalDpi xmlns:a14="http://schemas.microsoft.com/office/drawing/2010/main"/>
@@ -9830,13 +11739,690 @@
         </p:blipFill>
         <p:spPr>
           <a:xfrm rot="0">
-            <a:off x="1318260" y="1404620"/>
-            <a:ext cx="4051300" cy="3923030"/>
+            <a:off x="6831330" y="1437640"/>
+            <a:ext cx="2679065" cy="3550285"/>
+          </a:xfrm>
+          <a:prstGeom prst="roundRect"/>
+          <a:solidFill>
+            <a:srgbClr val="EDEDED"/>
+          </a:solidFill>
+        </p:spPr>
+      </p:pic>
+      <p:pic>
+        <p:nvPicPr>
+          <p:cNvPr id="88" name="그림 62" descr="C:/Users/Admin1/AppData/Roaming/PolarisOffice/ETemp/34236_8196696/fImage26982316827.png"/>
+          <p:cNvPicPr>
+            <a:picLocks noChangeAspect="1"/>
+          </p:cNvPicPr>
+          <p:nvPr/>
+        </p:nvPicPr>
+        <p:blipFill rotWithShape="1">
+          <a:blip r:embed="rId6" cstate="print">
+            <a:extLst>
+              <a:ext uri="{28A0092B-C50C-407E-A947-70E740481C1C}">
+                <a14:useLocalDpi xmlns:a14="http://schemas.microsoft.com/office/drawing/2010/main" val="0"/>
+              </a:ext>
+            </a:extLst>
+          </a:blip>
+          <a:stretch>
+            <a:fillRect/>
+          </a:stretch>
+        </p:blipFill>
+        <p:spPr>
+          <a:xfrm rot="0">
+            <a:off x="9922510" y="2601595"/>
+            <a:ext cx="1017270" cy="1206500"/>
+          </a:xfrm>
+          <a:prstGeom prst="roundRect"/>
+          <a:solidFill>
+            <a:srgbClr val="EDEDED"/>
+          </a:solidFill>
+        </p:spPr>
+      </p:pic>
+      <p:pic>
+        <p:nvPicPr>
+          <p:cNvPr id="89" name="그림 65" descr="C:/Users/Admin1/AppData/Roaming/PolarisOffice/ETemp/34236_8196696/fImage2242171946962.png"/>
+          <p:cNvPicPr>
+            <a:picLocks noChangeAspect="1"/>
+          </p:cNvPicPr>
+          <p:nvPr/>
+        </p:nvPicPr>
+        <p:blipFill rotWithShape="1">
+          <a:blip r:embed="rId7" cstate="hqprint">
+            <a:extLst>
+              <a:ext uri="{28A0092B-C50C-407E-A947-70E740481C1C}">
+                <a14:useLocalDpi xmlns:a14="http://schemas.microsoft.com/office/drawing/2010/main"/>
+              </a:ext>
+            </a:extLst>
+          </a:blip>
+          <a:stretch>
+            <a:fillRect/>
+          </a:stretch>
+        </p:blipFill>
+        <p:spPr>
+          <a:xfrm rot="0">
+            <a:off x="9060815" y="2919730"/>
+            <a:ext cx="1198880" cy="594995"/>
           </a:xfrm>
           <a:prstGeom prst="rect"/>
           <a:noFill/>
         </p:spPr>
       </p:pic>
+    </p:spTree>
+  </p:cSld>
+  <p:clrMapOvr>
+    <a:masterClrMapping/>
+  </p:clrMapOvr>
+  <mc:AlternateContent xmlns:mc="http://schemas.openxmlformats.org/markup-compatibility/2006">
+    <mc:Choice xmlns:p14="http://schemas.microsoft.com/office/powerpoint/2010/main" Requires="p14">
+      <p:transition spd="slow" p14:dur="1000"/>
+    </mc:Choice>
+    <mc:Fallback>
+      <p:transition spd="slow"/>
+    </mc:Fallback>
+  </mc:AlternateContent>
+  <p:timing>
+    <p:tnLst>
+      <p:par>
+        <p:cTn id="1" dur="indefinite" restart="never" nodeType="tmRoot"/>
+      </p:par>
+    </p:tnLst>
+  </p:timing>
+</p:sld>
+</file>
+
+<file path=ppt/slides/slide9.xml><?xml version="1.0" encoding="utf-8"?>
+<p:sld xmlns:a="http://schemas.openxmlformats.org/drawingml/2006/main" xmlns:r="http://schemas.openxmlformats.org/officeDocument/2006/relationships" xmlns:p="http://schemas.openxmlformats.org/presentationml/2006/main">
+  <p:cSld>
+    <p:spTree>
+      <p:nvGrpSpPr>
+        <p:cNvPr id="1" name=""/>
+        <p:cNvGrpSpPr/>
+        <p:nvPr/>
+      </p:nvGrpSpPr>
+      <p:grpSpPr>
+        <a:xfrm>
+          <a:off x="0" y="0"/>
+          <a:ext cx="0" cy="0"/>
+          <a:chOff x="0" y="0"/>
+          <a:chExt cx="0" cy="0"/>
+        </a:xfrm>
+      </p:grpSpPr>
+      <p:sp>
+        <p:nvSpPr>
+          <p:cNvPr id="2" name="Rect 0"/>
+          <p:cNvSpPr txBox="1">
+            <a:spLocks/>
+          </p:cNvSpPr>
+          <p:nvPr/>
+        </p:nvSpPr>
+        <p:spPr>
+          <a:xfrm rot="0">
+            <a:off x="4236085" y="419735"/>
+            <a:ext cx="3716655" cy="478155"/>
+          </a:xfrm>
+          <a:prstGeom prst="rect"/>
+          <a:noFill/>
+          <a:ln w="0">
+            <a:noFill/>
+            <a:prstDash/>
+          </a:ln>
+        </p:spPr>
+        <p:txBody>
+          <a:bodyPr wrap="square" lIns="89535" tIns="46355" rIns="89535" bIns="46355" numCol="1" vert="horz" anchor="t">
+            <a:spAutoFit/>
+          </a:bodyPr>
+          <a:lstStyle/>
+          <a:p>
+            <a:pPr marL="0" indent="0" rtl="0" algn="ctr" defTabSz="914400" eaLnBrk="1" latinLnBrk="0" hangingPunct="1">
+              <a:buFontTx/>
+              <a:buNone/>
+            </a:pPr>
+            <a:r>
+              <a:rPr lang="ko-KR" sz="2500" b="1">
+                <a:solidFill>
+                  <a:schemeClr val="tx1"/>
+                </a:solidFill>
+                <a:latin typeface="나눔바른고딕" charset="0"/>
+                <a:ea typeface="나눔바른고딕" charset="0"/>
+              </a:rPr>
+              <a:t>아홉</a:t>
+            </a:r>
+            <a:r>
+              <a:rPr lang="ko-KR" sz="2500" b="1">
+                <a:solidFill>
+                  <a:schemeClr val="tx1"/>
+                </a:solidFill>
+                <a:latin typeface="나눔바른고딕" charset="0"/>
+                <a:ea typeface="나눔바른고딕" charset="0"/>
+              </a:rPr>
+              <a:t> 번째 튜토리얼</a:t>
+            </a:r>
+            <a:endParaRPr lang="ko-KR" altLang="en-US" sz="2500" b="1">
+              <a:solidFill>
+                <a:schemeClr val="tx1"/>
+              </a:solidFill>
+              <a:latin typeface="나눔바른고딕" charset="0"/>
+              <a:ea typeface="나눔바른고딕" charset="0"/>
+            </a:endParaRPr>
+          </a:p>
+        </p:txBody>
+      </p:sp>
+      <p:sp>
+        <p:nvSpPr>
+          <p:cNvPr id="72" name="Rect 0"/>
+          <p:cNvSpPr txBox="1">
+            <a:spLocks/>
+          </p:cNvSpPr>
+          <p:nvPr/>
+        </p:nvSpPr>
+        <p:spPr>
+          <a:xfrm rot="0">
+            <a:off x="1252220" y="2566035"/>
+            <a:ext cx="4141470" cy="954405"/>
+          </a:xfrm>
+          <a:prstGeom prst="rect"/>
+          <a:noFill/>
+          <a:ln w="0">
+            <a:noFill/>
+            <a:prstDash/>
+          </a:ln>
+        </p:spPr>
+        <p:txBody>
+          <a:bodyPr wrap="square" lIns="89535" tIns="46355" rIns="89535" bIns="46355" numCol="1" vert="horz" anchor="t">
+            <a:spAutoFit/>
+          </a:bodyPr>
+          <a:lstStyle/>
+          <a:p>
+            <a:pPr marL="0" indent="0" rtl="0" algn="l" defTabSz="914400" eaLnBrk="1" latinLnBrk="0" hangingPunct="1">
+              <a:buFontTx/>
+              <a:buNone/>
+            </a:pPr>
+            <a:r>
+              <a:rPr lang="ko-KR" sz="2000" b="1">
+                <a:solidFill>
+                  <a:srgbClr val="0611F2"/>
+                </a:solidFill>
+                <a:latin typeface="맑은 고딕" charset="0"/>
+                <a:ea typeface="맑은 고딕" charset="0"/>
+              </a:rPr>
+              <a:t>28</a:t>
+            </a:r>
+            <a:r>
+              <a:rPr sz="2000" b="1">
+                <a:solidFill>
+                  <a:srgbClr val="0611F2"/>
+                </a:solidFill>
+                <a:latin typeface="맑은 고딕" charset="0"/>
+                <a:ea typeface="맑은 고딕" charset="0"/>
+              </a:rPr>
+              <a:t>.</a:t>
+            </a:r>
+            <a:r>
+              <a:rPr lang="ko-KR" sz="2000" b="1">
+                <a:solidFill>
+                  <a:srgbClr val="0611F2"/>
+                </a:solidFill>
+                <a:latin typeface="맑은 고딕" charset="0"/>
+                <a:ea typeface="맑은 고딕" charset="0"/>
+              </a:rPr>
+              <a:t> </a:t>
+            </a:r>
+            <a:r>
+              <a:rPr lang="ko-KR" sz="1800">
+                <a:latin typeface="맑은 고딕" charset="0"/>
+                <a:ea typeface="맑은 고딕" charset="0"/>
+              </a:rPr>
+              <a:t>그러고 나서 Billiard Ball (Two) </a:t>
+            </a:r>
+            <a:r>
+              <a:rPr lang="ko-KR" sz="1800">
+                <a:latin typeface="맑은 고딕" charset="0"/>
+                <a:ea typeface="맑은 고딕" charset="0"/>
+              </a:rPr>
+              <a:t>오브젝트의</a:t>
+            </a:r>
+            <a:r>
+              <a:rPr lang="ko-KR" sz="1800">
+                <a:latin typeface="맑은 고딕" charset="0"/>
+                <a:ea typeface="맑은 고딕" charset="0"/>
+              </a:rPr>
+              <a:t> </a:t>
+            </a:r>
+            <a:r>
+              <a:rPr lang="ko-KR" sz="1800">
+                <a:latin typeface="맑은 고딕" charset="0"/>
+                <a:ea typeface="맑은 고딕" charset="0"/>
+              </a:rPr>
+              <a:t>Tag를 Billiard Ball로 </a:t>
+            </a:r>
+            <a:r>
+              <a:rPr lang="ko-KR" sz="1800">
+                <a:latin typeface="맑은 고딕" charset="0"/>
+                <a:ea typeface="맑은 고딕" charset="0"/>
+              </a:rPr>
+              <a:t>설정합니</a:t>
+            </a:r>
+            <a:r>
+              <a:rPr lang="ko-KR" sz="1800">
+                <a:latin typeface="맑은 고딕" charset="0"/>
+                <a:ea typeface="맑은 고딕" charset="0"/>
+              </a:rPr>
+              <a:t>다.</a:t>
+            </a:r>
+            <a:endParaRPr lang="ko-KR" altLang="en-US" sz="1800">
+              <a:latin typeface="맑은 고딕" charset="0"/>
+              <a:ea typeface="맑은 고딕" charset="0"/>
+            </a:endParaRPr>
+          </a:p>
+        </p:txBody>
+      </p:sp>
+      <p:pic>
+        <p:nvPicPr>
+          <p:cNvPr id="90" name="그림 66" descr="C:/Users/Admin1/AppData/Roaming/PolarisOffice/ETemp/34236_8196696/fImage51192449961.png"/>
+          <p:cNvPicPr>
+            <a:picLocks noChangeAspect="1"/>
+          </p:cNvPicPr>
+          <p:nvPr/>
+        </p:nvPicPr>
+        <p:blipFill rotWithShape="1">
+          <a:blip r:embed="rId2" cstate="print">
+            <a:extLst>
+              <a:ext uri="{28A0092B-C50C-407E-A947-70E740481C1C}">
+                <a14:useLocalDpi xmlns:a14="http://schemas.microsoft.com/office/drawing/2010/main" val="0"/>
+              </a:ext>
+            </a:extLst>
+          </a:blip>
+          <a:stretch>
+            <a:fillRect/>
+          </a:stretch>
+        </p:blipFill>
+        <p:spPr>
+          <a:xfrm rot="0">
+            <a:off x="1252855" y="1438275"/>
+            <a:ext cx="4140200" cy="1025525"/>
+          </a:xfrm>
+          <a:prstGeom prst="roundRect"/>
+          <a:solidFill>
+            <a:srgbClr val="EDEDED"/>
+          </a:solidFill>
+        </p:spPr>
+      </p:pic>
+      <p:sp>
+        <p:nvSpPr>
+          <p:cNvPr id="93" name="텍스트 상자 71"/>
+          <p:cNvSpPr txBox="1">
+            <a:spLocks/>
+          </p:cNvSpPr>
+          <p:nvPr/>
+        </p:nvSpPr>
+        <p:spPr>
+          <a:xfrm rot="0">
+            <a:off x="1246505" y="5221605"/>
+            <a:ext cx="4146550" cy="954405"/>
+          </a:xfrm>
+          <a:prstGeom prst="rect"/>
+          <a:noFill/>
+          <a:ln w="0">
+            <a:noFill/>
+            <a:prstDash/>
+          </a:ln>
+        </p:spPr>
+        <p:txBody>
+          <a:bodyPr wrap="square" lIns="89535" tIns="46355" rIns="89535" bIns="46355" numCol="1" vert="horz" anchor="t">
+            <a:spAutoFit/>
+          </a:bodyPr>
+          <a:lstStyle/>
+          <a:p>
+            <a:pPr marL="0" indent="0" rtl="0" algn="l" defTabSz="914400" eaLnBrk="1" latinLnBrk="0" hangingPunct="1">
+              <a:buFontTx/>
+              <a:buNone/>
+            </a:pPr>
+            <a:r>
+              <a:rPr lang="ko-KR" sz="2000" b="1">
+                <a:solidFill>
+                  <a:srgbClr val="0611F2"/>
+                </a:solidFill>
+                <a:latin typeface="맑은 고딕" charset="0"/>
+                <a:ea typeface="맑은 고딕" charset="0"/>
+              </a:rPr>
+              <a:t>29</a:t>
+            </a:r>
+            <a:r>
+              <a:rPr sz="2000" b="1">
+                <a:solidFill>
+                  <a:srgbClr val="0611F2"/>
+                </a:solidFill>
+                <a:latin typeface="맑은 고딕" charset="0"/>
+                <a:ea typeface="맑은 고딕" charset="0"/>
+              </a:rPr>
+              <a:t>.</a:t>
+            </a:r>
+            <a:r>
+              <a:rPr lang="ko-KR" sz="2000" b="1">
+                <a:solidFill>
+                  <a:srgbClr val="0611F2"/>
+                </a:solidFill>
+                <a:latin typeface="맑은 고딕" charset="0"/>
+                <a:ea typeface="맑은 고딕" charset="0"/>
+              </a:rPr>
+              <a:t> </a:t>
+            </a:r>
+            <a:r>
+              <a:rPr lang="ko-KR" sz="1800">
+                <a:latin typeface="맑은 고딕" charset="0"/>
+                <a:ea typeface="맑은 고딕" charset="0"/>
+              </a:rPr>
+              <a:t>이제 Scout Robot 오브젝트를 </a:t>
+            </a:r>
+            <a:r>
+              <a:rPr lang="ko-KR" sz="1800">
+                <a:latin typeface="맑은 고딕" charset="0"/>
+                <a:ea typeface="맑은 고딕" charset="0"/>
+              </a:rPr>
+              <a:t>선택한</a:t>
+            </a:r>
+            <a:r>
+              <a:rPr lang="ko-KR" sz="1800">
+                <a:latin typeface="맑은 고딕" charset="0"/>
+                <a:ea typeface="맑은 고딕" charset="0"/>
+              </a:rPr>
+              <a:t> </a:t>
+            </a:r>
+            <a:r>
+              <a:rPr lang="ko-KR" sz="1800">
+                <a:latin typeface="맑은 고딕" charset="0"/>
+                <a:ea typeface="맑은 고딕" charset="0"/>
+              </a:rPr>
+              <a:t>다음 Robot Control </a:t>
+            </a:r>
+            <a:r>
+              <a:rPr lang="ko-KR" sz="1800">
+                <a:latin typeface="맑은 고딕" charset="0"/>
+                <a:ea typeface="맑은 고딕" charset="0"/>
+              </a:rPr>
+              <a:t>스크립트</a:t>
+            </a:r>
+            <a:r>
+              <a:rPr lang="ko-KR" sz="1800">
+                <a:latin typeface="맑은 고딕" charset="0"/>
+                <a:ea typeface="맑은 고딕" charset="0"/>
+              </a:rPr>
+              <a:t>를</a:t>
+            </a:r>
+            <a:r>
+              <a:rPr lang="ko-KR" sz="1800">
+                <a:latin typeface="맑은 고딕" charset="0"/>
+                <a:ea typeface="맑은 고딕" charset="0"/>
+              </a:rPr>
+              <a:t> </a:t>
+            </a:r>
+            <a:r>
+              <a:rPr lang="ko-KR" sz="1800">
+                <a:latin typeface="맑은 고딕" charset="0"/>
+                <a:ea typeface="맑은 고딕" charset="0"/>
+              </a:rPr>
+              <a:t>추가합니다.</a:t>
+            </a:r>
+            <a:endParaRPr lang="ko-KR" altLang="en-US" sz="1800">
+              <a:latin typeface="맑은 고딕" charset="0"/>
+              <a:ea typeface="맑은 고딕" charset="0"/>
+            </a:endParaRPr>
+          </a:p>
+        </p:txBody>
+      </p:sp>
+      <p:pic>
+        <p:nvPicPr>
+          <p:cNvPr id="94" name="그림 72" descr="C:/Users/Admin1/AppData/Roaming/PolarisOffice/ETemp/34236_8196696/fImage6225248491.png"/>
+          <p:cNvPicPr>
+            <a:picLocks noChangeAspect="1"/>
+          </p:cNvPicPr>
+          <p:nvPr/>
+        </p:nvPicPr>
+        <p:blipFill rotWithShape="1">
+          <a:blip r:embed="rId3" cstate="print">
+            <a:extLst>
+              <a:ext uri="{28A0092B-C50C-407E-A947-70E740481C1C}">
+                <a14:useLocalDpi xmlns:a14="http://schemas.microsoft.com/office/drawing/2010/main" val="0"/>
+              </a:ext>
+            </a:extLst>
+          </a:blip>
+          <a:stretch>
+            <a:fillRect/>
+          </a:stretch>
+        </p:blipFill>
+        <p:spPr>
+          <a:xfrm rot="0">
+            <a:off x="1249045" y="3642995"/>
+            <a:ext cx="4135120" cy="1447800"/>
+          </a:xfrm>
+          <a:prstGeom prst="roundRect"/>
+          <a:solidFill>
+            <a:srgbClr val="EDEDED"/>
+          </a:solidFill>
+        </p:spPr>
+      </p:pic>
+      <p:pic>
+        <p:nvPicPr>
+          <p:cNvPr id="95" name="그림 75" descr="C:/Users/Admin1/AppData/Roaming/PolarisOffice/ETemp/34236_8196696/fImage73512492995.png"/>
+          <p:cNvPicPr>
+            <a:picLocks noChangeAspect="1"/>
+          </p:cNvPicPr>
+          <p:nvPr/>
+        </p:nvPicPr>
+        <p:blipFill rotWithShape="1">
+          <a:blip r:embed="rId4" cstate="print">
+            <a:extLst>
+              <a:ext uri="{28A0092B-C50C-407E-A947-70E740481C1C}">
+                <a14:useLocalDpi xmlns:a14="http://schemas.microsoft.com/office/drawing/2010/main" val="0"/>
+              </a:ext>
+            </a:extLst>
+          </a:blip>
+          <a:stretch>
+            <a:fillRect/>
+          </a:stretch>
+        </p:blipFill>
+        <p:spPr>
+          <a:xfrm rot="0">
+            <a:off x="6822440" y="1438275"/>
+            <a:ext cx="1378585" cy="1137920"/>
+          </a:xfrm>
+          <a:prstGeom prst="roundRect"/>
+          <a:solidFill>
+            <a:srgbClr val="EDEDED"/>
+          </a:solidFill>
+        </p:spPr>
+      </p:pic>
+      <p:pic>
+        <p:nvPicPr>
+          <p:cNvPr id="96" name="그림 78" descr="C:/Users/Admin1/AppData/Roaming/PolarisOffice/ETemp/34236_8196696/fImage149612501942.png"/>
+          <p:cNvPicPr>
+            <a:picLocks noChangeAspect="1"/>
+          </p:cNvPicPr>
+          <p:nvPr/>
+        </p:nvPicPr>
+        <p:blipFill rotWithShape="1">
+          <a:blip r:embed="rId5" cstate="print">
+            <a:extLst>
+              <a:ext uri="{28A0092B-C50C-407E-A947-70E740481C1C}">
+                <a14:useLocalDpi xmlns:a14="http://schemas.microsoft.com/office/drawing/2010/main" val="0"/>
+              </a:ext>
+            </a:extLst>
+          </a:blip>
+          <a:stretch>
+            <a:fillRect/>
+          </a:stretch>
+        </p:blipFill>
+        <p:spPr>
+          <a:xfrm rot="0">
+            <a:off x="8312150" y="1430020"/>
+            <a:ext cx="2636520" cy="1139190"/>
+          </a:xfrm>
+          <a:prstGeom prst="roundRect"/>
+          <a:solidFill>
+            <a:srgbClr val="EDEDED"/>
+          </a:solidFill>
+        </p:spPr>
+      </p:pic>
+      <p:cxnSp>
+        <p:nvCxnSpPr>
+          <p:cNvPr id="97" name="도형 81"/>
+          <p:cNvCxnSpPr/>
+          <p:nvPr/>
+        </p:nvCxnSpPr>
+        <p:spPr>
+          <a:xfrm rot="0" flipH="1">
+            <a:off x="7537450" y="1886585"/>
+            <a:ext cx="2377440" cy="594995"/>
+          </a:xfrm>
+          <a:prstGeom prst="straightConnector1"/>
+          <a:ln w="6350" cap="flat" cmpd="sng">
+            <a:prstDash/>
+            <a:headEnd type="none" w="med" len="med"/>
+            <a:tailEnd type="triangle" w="med" len="med"/>
+          </a:ln>
+        </p:spPr>
+        <p:style>
+          <a:lnRef idx="1">
+            <a:schemeClr val="accent1"/>
+          </a:lnRef>
+          <a:fillRef idx="0">
+            <a:schemeClr val="accent1"/>
+          </a:fillRef>
+          <a:effectRef idx="0">
+            <a:schemeClr val="accent1"/>
+          </a:effectRef>
+          <a:fontRef idx="minor">
+            <a:schemeClr val="tx1"/>
+          </a:fontRef>
+        </p:style>
+      </p:cxnSp>
+      <p:sp>
+        <p:nvSpPr>
+          <p:cNvPr id="98" name="텍스트 상자 82"/>
+          <p:cNvSpPr txBox="1">
+            <a:spLocks/>
+          </p:cNvSpPr>
+          <p:nvPr/>
+        </p:nvSpPr>
+        <p:spPr>
+          <a:xfrm rot="0">
+            <a:off x="6819265" y="2680970"/>
+            <a:ext cx="4138295" cy="954405"/>
+          </a:xfrm>
+          <a:prstGeom prst="rect"/>
+          <a:noFill/>
+          <a:ln w="0">
+            <a:noFill/>
+            <a:prstDash/>
+          </a:ln>
+        </p:spPr>
+        <p:txBody>
+          <a:bodyPr wrap="square" lIns="89535" tIns="46355" rIns="89535" bIns="46355" numCol="1" vert="horz" anchor="t">
+            <a:spAutoFit/>
+          </a:bodyPr>
+          <a:lstStyle/>
+          <a:p>
+            <a:pPr marL="0" indent="0" rtl="0" algn="l" defTabSz="914400" eaLnBrk="1" latinLnBrk="0" hangingPunct="1">
+              <a:buFontTx/>
+              <a:buNone/>
+            </a:pPr>
+            <a:r>
+              <a:rPr lang="ko-KR" sz="2000" b="1">
+                <a:solidFill>
+                  <a:srgbClr val="0611F2"/>
+                </a:solidFill>
+                <a:latin typeface="맑은 고딕" charset="0"/>
+                <a:ea typeface="맑은 고딕" charset="0"/>
+              </a:rPr>
+              <a:t>3</a:t>
+            </a:r>
+            <a:r>
+              <a:rPr lang="ko-KR" sz="2000" b="1">
+                <a:solidFill>
+                  <a:srgbClr val="0611F2"/>
+                </a:solidFill>
+                <a:latin typeface="맑은 고딕" charset="0"/>
+                <a:ea typeface="맑은 고딕" charset="0"/>
+              </a:rPr>
+              <a:t>0</a:t>
+            </a:r>
+            <a:r>
+              <a:rPr sz="2000" b="1">
+                <a:solidFill>
+                  <a:srgbClr val="0611F2"/>
+                </a:solidFill>
+                <a:latin typeface="맑은 고딕" charset="0"/>
+                <a:ea typeface="맑은 고딕" charset="0"/>
+              </a:rPr>
+              <a:t>.</a:t>
+            </a:r>
+            <a:r>
+              <a:rPr lang="ko-KR" sz="2000" b="1">
+                <a:solidFill>
+                  <a:srgbClr val="0611F2"/>
+                </a:solidFill>
+                <a:latin typeface="맑은 고딕" charset="0"/>
+                <a:ea typeface="맑은 고딕" charset="0"/>
+              </a:rPr>
+              <a:t> </a:t>
+            </a:r>
+            <a:r>
+              <a:rPr lang="ko-KR" sz="1800">
+                <a:latin typeface="맑은 고딕" charset="0"/>
+                <a:ea typeface="맑은 고딕" charset="0"/>
+              </a:rPr>
+              <a:t>그리고 Project 폴더 아래에 </a:t>
+            </a:r>
+            <a:r>
+              <a:rPr lang="ko-KR" sz="1800">
+                <a:latin typeface="맑은 고딕" charset="0"/>
+                <a:ea typeface="맑은 고딕" charset="0"/>
+              </a:rPr>
+              <a:t>있는 </a:t>
+            </a:r>
+            <a:r>
+              <a:rPr lang="ko-KR" sz="1800">
+                <a:latin typeface="맑은 고딕" charset="0"/>
+                <a:ea typeface="맑은 고딕" charset="0"/>
+              </a:rPr>
+              <a:t>Texture</a:t>
+            </a:r>
+            <a:r>
+              <a:rPr lang="ko-KR" sz="1800">
+                <a:latin typeface="맑은 고딕" charset="0"/>
+                <a:ea typeface="맑은 고딕" charset="0"/>
+              </a:rPr>
+              <a:t> 폴더에 Board 텍스처를 Board </a:t>
+            </a:r>
+            <a:r>
+              <a:rPr lang="ko-KR" sz="1800">
+                <a:latin typeface="맑은 고딕" charset="0"/>
+                <a:ea typeface="맑은 고딕" charset="0"/>
+              </a:rPr>
+              <a:t>오브젝트에</a:t>
+            </a:r>
+            <a:r>
+              <a:rPr lang="ko-KR" sz="1800">
+                <a:latin typeface="맑은 고딕" charset="0"/>
+                <a:ea typeface="맑은 고딕" charset="0"/>
+              </a:rPr>
+              <a:t> </a:t>
+            </a:r>
+            <a:r>
+              <a:rPr lang="ko-KR" sz="1800">
+                <a:latin typeface="맑은 고딕" charset="0"/>
+                <a:ea typeface="맑은 고딕" charset="0"/>
+              </a:rPr>
+              <a:t>넣어줍니다.</a:t>
+            </a:r>
+            <a:endParaRPr lang="ko-KR" altLang="en-US" sz="1800">
+              <a:latin typeface="맑은 고딕" charset="0"/>
+              <a:ea typeface="맑은 고딕" charset="0"/>
+            </a:endParaRPr>
+          </a:p>
+        </p:txBody>
+      </p:sp>
     </p:spTree>
   </p:cSld>
   <p:clrMapOvr>

</xml_diff>